<commit_message>
add datathon presentation updated
</commit_message>
<xml_diff>
--- a/latexDocuments/datathon/Datathon_presentation.pptx
+++ b/latexDocuments/datathon/Datathon_presentation.pptx
@@ -13,10 +13,13 @@
     <p:sldId id="260" r:id="rId7"/>
     <p:sldId id="261" r:id="rId8"/>
     <p:sldId id="267" r:id="rId9"/>
-    <p:sldId id="266" r:id="rId10"/>
-    <p:sldId id="271" r:id="rId11"/>
-    <p:sldId id="274" r:id="rId12"/>
-    <p:sldId id="275" r:id="rId13"/>
+    <p:sldId id="276" r:id="rId10"/>
+    <p:sldId id="277" r:id="rId11"/>
+    <p:sldId id="266" r:id="rId12"/>
+    <p:sldId id="271" r:id="rId13"/>
+    <p:sldId id="274" r:id="rId14"/>
+    <p:sldId id="275" r:id="rId15"/>
+    <p:sldId id="278" r:id="rId16"/>
   </p:sldIdLst>
   <p:sldSz cx="12192000" cy="6858000"/>
   <p:notesSz cx="6858000" cy="9144000"/>
@@ -5845,7 +5848,7 @@
           <p:cNvPr id="2" name="Title 1">
             <a:extLst>
               <a:ext uri="{FF2B5EF4-FFF2-40B4-BE49-F238E27FC236}">
-                <a16:creationId xmlns:a16="http://schemas.microsoft.com/office/drawing/2014/main" xmlns="" id="{6C7230F4-1350-7046-87B6-D6068C719055}"/>
+                <a16:creationId xmlns="" xmlns:a16="http://schemas.microsoft.com/office/drawing/2014/main" id="{6C7230F4-1350-7046-87B6-D6068C719055}"/>
               </a:ext>
             </a:extLst>
           </p:cNvPr>
@@ -5858,7 +5861,7 @@
         </p:nvSpPr>
         <p:spPr>
           <a:xfrm>
-            <a:off x="1700213" y="546629"/>
+            <a:off x="1328738" y="903816"/>
             <a:ext cx="7824787" cy="2037292"/>
           </a:xfrm>
         </p:spPr>
@@ -5900,7 +5903,7 @@
           <p:cNvPr id="4" name="Title 1">
             <a:extLst>
               <a:ext uri="{FF2B5EF4-FFF2-40B4-BE49-F238E27FC236}">
-                <a16:creationId xmlns:a16="http://schemas.microsoft.com/office/drawing/2014/main" xmlns="" id="{AAB2319D-A907-B04A-B439-41CA57FB2B69}"/>
+                <a16:creationId xmlns="" xmlns:a16="http://schemas.microsoft.com/office/drawing/2014/main" id="{AAB2319D-A907-B04A-B439-41CA57FB2B69}"/>
               </a:ext>
             </a:extLst>
           </p:cNvPr>
@@ -5911,7 +5914,7 @@
         </p:nvSpPr>
         <p:spPr>
           <a:xfrm>
-            <a:off x="938212" y="4345517"/>
+            <a:off x="669131" y="4345517"/>
             <a:ext cx="9144000" cy="1049337"/>
           </a:xfrm>
           <a:prstGeom prst="rect">
@@ -5971,6 +5974,13 @@
   <p:clrMapOvr>
     <a:masterClrMapping/>
   </p:clrMapOvr>
+  <p:timing>
+    <p:tnLst>
+      <p:par>
+        <p:cTn id="1" dur="indefinite" restart="never" nodeType="tmRoot"/>
+      </p:par>
+    </p:tnLst>
+  </p:timing>
 </p:sld>
 </file>
 
@@ -5996,7 +6006,1110 @@
           <p:cNvPr id="16" name="Rectangle 15">
             <a:extLst>
               <a:ext uri="{FF2B5EF4-FFF2-40B4-BE49-F238E27FC236}">
-                <a16:creationId xmlns:a16="http://schemas.microsoft.com/office/drawing/2014/main" xmlns="" id="{E131166B-4C10-BC44-9967-4AF22CC16AFD}"/>
+                <a16:creationId xmlns="" xmlns:a16="http://schemas.microsoft.com/office/drawing/2014/main" id="{E131166B-4C10-BC44-9967-4AF22CC16AFD}"/>
+              </a:ext>
+            </a:extLst>
+          </p:cNvPr>
+          <p:cNvSpPr/>
+          <p:nvPr/>
+        </p:nvSpPr>
+        <p:spPr>
+          <a:xfrm>
+            <a:off x="8415558" y="1115488"/>
+            <a:ext cx="3543300" cy="5724285"/>
+          </a:xfrm>
+          <a:prstGeom prst="rect">
+            <a:avLst/>
+          </a:prstGeom>
+          <a:solidFill>
+            <a:schemeClr val="bg1"/>
+          </a:solidFill>
+          <a:ln>
+            <a:noFill/>
+          </a:ln>
+        </p:spPr>
+        <p:style>
+          <a:lnRef idx="2">
+            <a:schemeClr val="accent1">
+              <a:shade val="50000"/>
+            </a:schemeClr>
+          </a:lnRef>
+          <a:fillRef idx="1">
+            <a:schemeClr val="accent1"/>
+          </a:fillRef>
+          <a:effectRef idx="0">
+            <a:schemeClr val="accent1"/>
+          </a:effectRef>
+          <a:fontRef idx="minor">
+            <a:schemeClr val="lt1"/>
+          </a:fontRef>
+        </p:style>
+        <p:txBody>
+          <a:bodyPr rtlCol="0" anchor="ctr"/>
+          <a:lstStyle/>
+          <a:p>
+            <a:pPr algn="ctr"/>
+            <a:r>
+              <a:rPr lang="en-US" dirty="0"/>
+              <a:t>Most of the people that live in those areas are adults over 40 years old, some families with children.\item Most of them with higher incomes ($50000&lt;$ incomes $&lt; 200.000$ USD) than the ones that live in the zones with yellow\_indicator = $0$. Excluding the ones with incomes $&gt; 200.000$</a:t>
+            </a:r>
+            <a:endParaRPr lang="en-US" dirty="0"/>
+          </a:p>
+        </p:txBody>
+      </p:sp>
+      <p:sp>
+        <p:nvSpPr>
+          <p:cNvPr id="3" name="Title 1">
+            <a:extLst>
+              <a:ext uri="{FF2B5EF4-FFF2-40B4-BE49-F238E27FC236}">
+                <a16:creationId xmlns="" xmlns:a16="http://schemas.microsoft.com/office/drawing/2014/main" id="{AAB0CBC3-D15A-994D-9504-599724A96D06}"/>
+              </a:ext>
+            </a:extLst>
+          </p:cNvPr>
+          <p:cNvSpPr txBox="1">
+            <a:spLocks/>
+          </p:cNvSpPr>
+          <p:nvPr/>
+        </p:nvSpPr>
+        <p:spPr>
+          <a:xfrm>
+            <a:off x="885824" y="-36418"/>
+            <a:ext cx="8415339" cy="671513"/>
+          </a:xfrm>
+          <a:prstGeom prst="rect">
+            <a:avLst/>
+          </a:prstGeom>
+        </p:spPr>
+        <p:txBody>
+          <a:bodyPr vert="horz" lIns="91440" tIns="45720" rIns="91440" bIns="45720" rtlCol="0" anchor="t">
+            <a:noAutofit/>
+          </a:bodyPr>
+          <a:lstStyle>
+            <a:lvl1pPr algn="l" defTabSz="457200" rtl="0" eaLnBrk="1" latinLnBrk="0" hangingPunct="1">
+              <a:spcBef>
+                <a:spcPct val="0"/>
+              </a:spcBef>
+              <a:buNone/>
+              <a:defRPr sz="3600" kern="1200">
+                <a:solidFill>
+                  <a:schemeClr val="accent1"/>
+                </a:solidFill>
+                <a:latin typeface="+mj-lt"/>
+                <a:ea typeface="+mj-ea"/>
+                <a:cs typeface="+mj-cs"/>
+              </a:defRPr>
+            </a:lvl1pPr>
+            <a:lvl2pPr eaLnBrk="1" hangingPunct="1">
+              <a:defRPr>
+                <a:solidFill>
+                  <a:schemeClr val="tx2"/>
+                </a:solidFill>
+              </a:defRPr>
+            </a:lvl2pPr>
+            <a:lvl3pPr eaLnBrk="1" hangingPunct="1">
+              <a:defRPr>
+                <a:solidFill>
+                  <a:schemeClr val="tx2"/>
+                </a:solidFill>
+              </a:defRPr>
+            </a:lvl3pPr>
+            <a:lvl4pPr eaLnBrk="1" hangingPunct="1">
+              <a:defRPr>
+                <a:solidFill>
+                  <a:schemeClr val="tx2"/>
+                </a:solidFill>
+              </a:defRPr>
+            </a:lvl4pPr>
+            <a:lvl5pPr eaLnBrk="1" hangingPunct="1">
+              <a:defRPr>
+                <a:solidFill>
+                  <a:schemeClr val="tx2"/>
+                </a:solidFill>
+              </a:defRPr>
+            </a:lvl5pPr>
+            <a:lvl6pPr eaLnBrk="1" hangingPunct="1">
+              <a:defRPr>
+                <a:solidFill>
+                  <a:schemeClr val="tx2"/>
+                </a:solidFill>
+              </a:defRPr>
+            </a:lvl6pPr>
+            <a:lvl7pPr eaLnBrk="1" hangingPunct="1">
+              <a:defRPr>
+                <a:solidFill>
+                  <a:schemeClr val="tx2"/>
+                </a:solidFill>
+              </a:defRPr>
+            </a:lvl7pPr>
+            <a:lvl8pPr eaLnBrk="1" hangingPunct="1">
+              <a:defRPr>
+                <a:solidFill>
+                  <a:schemeClr val="tx2"/>
+                </a:solidFill>
+              </a:defRPr>
+            </a:lvl8pPr>
+            <a:lvl9pPr eaLnBrk="1" hangingPunct="1">
+              <a:defRPr>
+                <a:solidFill>
+                  <a:schemeClr val="tx2"/>
+                </a:solidFill>
+              </a:defRPr>
+            </a:lvl9pPr>
+          </a:lstStyle>
+          <a:p>
+            <a:pPr algn="ctr"/>
+            <a:r>
+              <a:rPr lang="en-US" sz="4900" b="1" dirty="0" smtClean="0">
+                <a:solidFill>
+                  <a:schemeClr val="tx1"/>
+                </a:solidFill>
+              </a:rPr>
+              <a:t>Statistical Analysis</a:t>
+            </a:r>
+            <a:endParaRPr lang="en-US" sz="4900" b="1" dirty="0">
+              <a:solidFill>
+                <a:schemeClr val="tx1"/>
+              </a:solidFill>
+            </a:endParaRPr>
+          </a:p>
+        </p:txBody>
+      </p:sp>
+      <p:sp>
+        <p:nvSpPr>
+          <p:cNvPr id="4" name="Rectangle 3"/>
+          <p:cNvSpPr/>
+          <p:nvPr/>
+        </p:nvSpPr>
+        <p:spPr>
+          <a:xfrm>
+            <a:off x="342901" y="880369"/>
+            <a:ext cx="11849099" cy="738664"/>
+          </a:xfrm>
+          <a:prstGeom prst="rect">
+            <a:avLst/>
+          </a:prstGeom>
+        </p:spPr>
+        <p:txBody>
+          <a:bodyPr wrap="square">
+            <a:spAutoFit/>
+          </a:bodyPr>
+          <a:lstStyle/>
+          <a:p>
+            <a:r>
+              <a:rPr lang="en-US" sz="2100" b="1" dirty="0" smtClean="0"/>
+              <a:t>From EDA: </a:t>
+            </a:r>
+          </a:p>
+          <a:p>
+            <a:r>
+              <a:rPr lang="en-US" sz="2100" dirty="0"/>
+              <a:t>	</a:t>
+            </a:r>
+            <a:r>
+              <a:rPr lang="en-US" sz="2100" dirty="0" smtClean="0"/>
+              <a:t>- H3 </a:t>
+            </a:r>
+            <a:r>
+              <a:rPr lang="en-US" sz="2100" dirty="0" smtClean="0">
+                <a:sym typeface="Wingdings"/>
+              </a:rPr>
+              <a:t> rejected</a:t>
+            </a:r>
+            <a:endParaRPr lang="en-US" sz="2100" dirty="0" smtClean="0"/>
+          </a:p>
+        </p:txBody>
+      </p:sp>
+      <p:pic>
+        <p:nvPicPr>
+          <p:cNvPr id="5" name="Picture 4"/>
+          <p:cNvPicPr>
+            <a:picLocks noChangeAspect="1"/>
+          </p:cNvPicPr>
+          <p:nvPr/>
+        </p:nvPicPr>
+        <p:blipFill>
+          <a:blip r:embed="rId2">
+            <a:extLst>
+              <a:ext uri="{28A0092B-C50C-407E-A947-70E740481C1C}">
+                <a14:useLocalDpi xmlns:a14="http://schemas.microsoft.com/office/drawing/2010/main" val="0"/>
+              </a:ext>
+            </a:extLst>
+          </a:blip>
+          <a:stretch>
+            <a:fillRect/>
+          </a:stretch>
+        </p:blipFill>
+        <p:spPr>
+          <a:xfrm>
+            <a:off x="4763945" y="917461"/>
+            <a:ext cx="7428055" cy="5940539"/>
+          </a:xfrm>
+          <a:prstGeom prst="rect">
+            <a:avLst/>
+          </a:prstGeom>
+        </p:spPr>
+      </p:pic>
+      <p:sp>
+        <p:nvSpPr>
+          <p:cNvPr id="6" name="Rectangle 5"/>
+          <p:cNvSpPr/>
+          <p:nvPr/>
+        </p:nvSpPr>
+        <p:spPr>
+          <a:xfrm>
+            <a:off x="171450" y="2223304"/>
+            <a:ext cx="4530080" cy="2031325"/>
+          </a:xfrm>
+          <a:prstGeom prst="rect">
+            <a:avLst/>
+          </a:prstGeom>
+        </p:spPr>
+        <p:txBody>
+          <a:bodyPr wrap="square">
+            <a:spAutoFit/>
+          </a:bodyPr>
+          <a:lstStyle/>
+          <a:p>
+            <a:r>
+              <a:rPr lang="en-US" dirty="0"/>
+              <a:t>Most of the people that live in </a:t>
+            </a:r>
+            <a:r>
+              <a:rPr lang="en-US" dirty="0" smtClean="0"/>
+              <a:t>the yellow areas are:</a:t>
+            </a:r>
+          </a:p>
+          <a:p>
+            <a:pPr marL="285750" indent="-285750">
+              <a:buFont typeface="Arial" charset="0"/>
+              <a:buChar char="•"/>
+            </a:pPr>
+            <a:r>
+              <a:rPr lang="en-US" dirty="0" smtClean="0"/>
+              <a:t>Adults </a:t>
+            </a:r>
+            <a:r>
+              <a:rPr lang="en-US" dirty="0"/>
+              <a:t>over 40 years old, some families with </a:t>
+            </a:r>
+            <a:r>
+              <a:rPr lang="en-US" dirty="0" smtClean="0"/>
+              <a:t>children.</a:t>
+            </a:r>
+          </a:p>
+          <a:p>
+            <a:pPr marL="285750" indent="-285750">
+              <a:buFont typeface="Arial" charset="0"/>
+              <a:buChar char="•"/>
+            </a:pPr>
+            <a:r>
+              <a:rPr lang="en-US" dirty="0" smtClean="0"/>
+              <a:t>With higher </a:t>
+            </a:r>
+            <a:r>
+              <a:rPr lang="en-US" dirty="0"/>
+              <a:t>incomes </a:t>
+            </a:r>
+            <a:r>
+              <a:rPr lang="en-US" dirty="0" smtClean="0"/>
+              <a:t>(50000&lt; </a:t>
+            </a:r>
+            <a:r>
+              <a:rPr lang="en-US" dirty="0"/>
+              <a:t>incomes </a:t>
+            </a:r>
+            <a:r>
+              <a:rPr lang="en-US" dirty="0" smtClean="0"/>
+              <a:t>&lt; 200.000 USD). Excluding </a:t>
+            </a:r>
+            <a:r>
+              <a:rPr lang="en-US" dirty="0"/>
+              <a:t>the ones with incomes $&gt; 200.000$</a:t>
+            </a:r>
+          </a:p>
+        </p:txBody>
+      </p:sp>
+    </p:spTree>
+    <p:extLst>
+      <p:ext uri="{BB962C8B-B14F-4D97-AF65-F5344CB8AC3E}">
+        <p14:creationId xmlns:p14="http://schemas.microsoft.com/office/powerpoint/2010/main" val="552156986"/>
+      </p:ext>
+    </p:extLst>
+  </p:cSld>
+  <p:clrMapOvr>
+    <a:masterClrMapping/>
+  </p:clrMapOvr>
+  <p:timing>
+    <p:tnLst>
+      <p:par>
+        <p:cTn id="1" dur="indefinite" restart="never" nodeType="tmRoot"/>
+      </p:par>
+    </p:tnLst>
+  </p:timing>
+</p:sld>
+</file>
+
+<file path=ppt/slides/slide11.xml><?xml version="1.0" encoding="utf-8"?>
+<p:sld xmlns:a="http://schemas.openxmlformats.org/drawingml/2006/main" xmlns:r="http://schemas.openxmlformats.org/officeDocument/2006/relationships" xmlns:p="http://schemas.openxmlformats.org/presentationml/2006/main">
+  <p:cSld>
+    <p:spTree>
+      <p:nvGrpSpPr>
+        <p:cNvPr id="1" name=""/>
+        <p:cNvGrpSpPr/>
+        <p:nvPr/>
+      </p:nvGrpSpPr>
+      <p:grpSpPr>
+        <a:xfrm>
+          <a:off x="0" y="0"/>
+          <a:ext cx="0" cy="0"/>
+          <a:chOff x="0" y="0"/>
+          <a:chExt cx="0" cy="0"/>
+        </a:xfrm>
+      </p:grpSpPr>
+      <p:sp>
+        <p:nvSpPr>
+          <p:cNvPr id="16" name="Rectangle 15">
+            <a:extLst>
+              <a:ext uri="{FF2B5EF4-FFF2-40B4-BE49-F238E27FC236}">
+                <a16:creationId xmlns="" xmlns:a16="http://schemas.microsoft.com/office/drawing/2014/main" id="{E131166B-4C10-BC44-9967-4AF22CC16AFD}"/>
+              </a:ext>
+            </a:extLst>
+          </p:cNvPr>
+          <p:cNvSpPr/>
+          <p:nvPr/>
+        </p:nvSpPr>
+        <p:spPr>
+          <a:xfrm>
+            <a:off x="8384380" y="421305"/>
+            <a:ext cx="3543300" cy="5724285"/>
+          </a:xfrm>
+          <a:prstGeom prst="rect">
+            <a:avLst/>
+          </a:prstGeom>
+          <a:solidFill>
+            <a:schemeClr val="bg1"/>
+          </a:solidFill>
+          <a:ln>
+            <a:noFill/>
+          </a:ln>
+        </p:spPr>
+        <p:style>
+          <a:lnRef idx="2">
+            <a:schemeClr val="accent1">
+              <a:shade val="50000"/>
+            </a:schemeClr>
+          </a:lnRef>
+          <a:fillRef idx="1">
+            <a:schemeClr val="accent1"/>
+          </a:fillRef>
+          <a:effectRef idx="0">
+            <a:schemeClr val="accent1"/>
+          </a:effectRef>
+          <a:fontRef idx="minor">
+            <a:schemeClr val="lt1"/>
+          </a:fontRef>
+        </p:style>
+        <p:txBody>
+          <a:bodyPr rtlCol="0" anchor="ctr"/>
+          <a:lstStyle/>
+          <a:p>
+            <a:pPr algn="ctr"/>
+            <a:endParaRPr lang="en-US"/>
+          </a:p>
+        </p:txBody>
+      </p:sp>
+      <p:sp>
+        <p:nvSpPr>
+          <p:cNvPr id="3" name="Title 1">
+            <a:extLst>
+              <a:ext uri="{FF2B5EF4-FFF2-40B4-BE49-F238E27FC236}">
+                <a16:creationId xmlns="" xmlns:a16="http://schemas.microsoft.com/office/drawing/2014/main" id="{AAB0CBC3-D15A-994D-9504-599724A96D06}"/>
+              </a:ext>
+            </a:extLst>
+          </p:cNvPr>
+          <p:cNvSpPr txBox="1">
+            <a:spLocks/>
+          </p:cNvSpPr>
+          <p:nvPr/>
+        </p:nvSpPr>
+        <p:spPr>
+          <a:xfrm>
+            <a:off x="443256" y="0"/>
+            <a:ext cx="3957639" cy="671513"/>
+          </a:xfrm>
+          <a:prstGeom prst="rect">
+            <a:avLst/>
+          </a:prstGeom>
+        </p:spPr>
+        <p:txBody>
+          <a:bodyPr vert="horz" lIns="91440" tIns="45720" rIns="91440" bIns="45720" rtlCol="0" anchor="t">
+            <a:noAutofit/>
+          </a:bodyPr>
+          <a:lstStyle>
+            <a:lvl1pPr algn="l" defTabSz="457200" rtl="0" eaLnBrk="1" latinLnBrk="0" hangingPunct="1">
+              <a:spcBef>
+                <a:spcPct val="0"/>
+              </a:spcBef>
+              <a:buNone/>
+              <a:defRPr sz="3600" kern="1200">
+                <a:solidFill>
+                  <a:schemeClr val="accent1"/>
+                </a:solidFill>
+                <a:latin typeface="+mj-lt"/>
+                <a:ea typeface="+mj-ea"/>
+                <a:cs typeface="+mj-cs"/>
+              </a:defRPr>
+            </a:lvl1pPr>
+            <a:lvl2pPr eaLnBrk="1" hangingPunct="1">
+              <a:defRPr>
+                <a:solidFill>
+                  <a:schemeClr val="tx2"/>
+                </a:solidFill>
+              </a:defRPr>
+            </a:lvl2pPr>
+            <a:lvl3pPr eaLnBrk="1" hangingPunct="1">
+              <a:defRPr>
+                <a:solidFill>
+                  <a:schemeClr val="tx2"/>
+                </a:solidFill>
+              </a:defRPr>
+            </a:lvl3pPr>
+            <a:lvl4pPr eaLnBrk="1" hangingPunct="1">
+              <a:defRPr>
+                <a:solidFill>
+                  <a:schemeClr val="tx2"/>
+                </a:solidFill>
+              </a:defRPr>
+            </a:lvl4pPr>
+            <a:lvl5pPr eaLnBrk="1" hangingPunct="1">
+              <a:defRPr>
+                <a:solidFill>
+                  <a:schemeClr val="tx2"/>
+                </a:solidFill>
+              </a:defRPr>
+            </a:lvl5pPr>
+            <a:lvl6pPr eaLnBrk="1" hangingPunct="1">
+              <a:defRPr>
+                <a:solidFill>
+                  <a:schemeClr val="tx2"/>
+                </a:solidFill>
+              </a:defRPr>
+            </a:lvl6pPr>
+            <a:lvl7pPr eaLnBrk="1" hangingPunct="1">
+              <a:defRPr>
+                <a:solidFill>
+                  <a:schemeClr val="tx2"/>
+                </a:solidFill>
+              </a:defRPr>
+            </a:lvl7pPr>
+            <a:lvl8pPr eaLnBrk="1" hangingPunct="1">
+              <a:defRPr>
+                <a:solidFill>
+                  <a:schemeClr val="tx2"/>
+                </a:solidFill>
+              </a:defRPr>
+            </a:lvl8pPr>
+            <a:lvl9pPr eaLnBrk="1" hangingPunct="1">
+              <a:defRPr>
+                <a:solidFill>
+                  <a:schemeClr val="tx2"/>
+                </a:solidFill>
+              </a:defRPr>
+            </a:lvl9pPr>
+          </a:lstStyle>
+          <a:p>
+            <a:pPr algn="ctr"/>
+            <a:r>
+              <a:rPr lang="en-US" sz="4900" b="1" dirty="0">
+                <a:solidFill>
+                  <a:schemeClr val="tx1"/>
+                </a:solidFill>
+              </a:rPr>
+              <a:t>Key </a:t>
+            </a:r>
+            <a:r>
+              <a:rPr lang="en-US" sz="4900" b="1" dirty="0" smtClean="0">
+                <a:solidFill>
+                  <a:schemeClr val="tx1"/>
+                </a:solidFill>
+              </a:rPr>
+              <a:t>Findings</a:t>
+            </a:r>
+            <a:endParaRPr lang="en-US" sz="4900" b="1" dirty="0">
+              <a:solidFill>
+                <a:schemeClr val="tx1"/>
+              </a:solidFill>
+            </a:endParaRPr>
+          </a:p>
+        </p:txBody>
+      </p:sp>
+      <p:sp>
+        <p:nvSpPr>
+          <p:cNvPr id="8" name="Title 1">
+            <a:extLst>
+              <a:ext uri="{FF2B5EF4-FFF2-40B4-BE49-F238E27FC236}">
+                <a16:creationId xmlns="" xmlns:a16="http://schemas.microsoft.com/office/drawing/2014/main" id="{AAB0CBC3-D15A-994D-9504-599724A96D06}"/>
+              </a:ext>
+            </a:extLst>
+          </p:cNvPr>
+          <p:cNvSpPr txBox="1">
+            <a:spLocks/>
+          </p:cNvSpPr>
+          <p:nvPr/>
+        </p:nvSpPr>
+        <p:spPr>
+          <a:xfrm>
+            <a:off x="191114" y="1428103"/>
+            <a:ext cx="4461922" cy="985208"/>
+          </a:xfrm>
+          <a:prstGeom prst="rect">
+            <a:avLst/>
+          </a:prstGeom>
+        </p:spPr>
+        <p:txBody>
+          <a:bodyPr vert="horz" lIns="91440" tIns="45720" rIns="91440" bIns="45720" rtlCol="0" anchor="t">
+            <a:noAutofit/>
+            <a:scene3d>
+              <a:camera prst="orthographicFront"/>
+              <a:lightRig rig="threePt" dir="t"/>
+            </a:scene3d>
+            <a:sp3d extrusionH="57150">
+              <a:bevelT w="82550" h="38100" prst="coolSlant"/>
+              <a:bevelB w="82550" h="38100" prst="coolSlant"/>
+            </a:sp3d>
+          </a:bodyPr>
+          <a:lstStyle>
+            <a:lvl1pPr algn="l" defTabSz="457200" rtl="0" eaLnBrk="1" latinLnBrk="0" hangingPunct="1">
+              <a:spcBef>
+                <a:spcPct val="0"/>
+              </a:spcBef>
+              <a:buNone/>
+              <a:defRPr sz="3600" kern="1200">
+                <a:solidFill>
+                  <a:schemeClr val="accent1"/>
+                </a:solidFill>
+                <a:latin typeface="+mj-lt"/>
+                <a:ea typeface="+mj-ea"/>
+                <a:cs typeface="+mj-cs"/>
+              </a:defRPr>
+            </a:lvl1pPr>
+            <a:lvl2pPr eaLnBrk="1" hangingPunct="1">
+              <a:defRPr>
+                <a:solidFill>
+                  <a:schemeClr val="tx2"/>
+                </a:solidFill>
+              </a:defRPr>
+            </a:lvl2pPr>
+            <a:lvl3pPr eaLnBrk="1" hangingPunct="1">
+              <a:defRPr>
+                <a:solidFill>
+                  <a:schemeClr val="tx2"/>
+                </a:solidFill>
+              </a:defRPr>
+            </a:lvl3pPr>
+            <a:lvl4pPr eaLnBrk="1" hangingPunct="1">
+              <a:defRPr>
+                <a:solidFill>
+                  <a:schemeClr val="tx2"/>
+                </a:solidFill>
+              </a:defRPr>
+            </a:lvl4pPr>
+            <a:lvl5pPr eaLnBrk="1" hangingPunct="1">
+              <a:defRPr>
+                <a:solidFill>
+                  <a:schemeClr val="tx2"/>
+                </a:solidFill>
+              </a:defRPr>
+            </a:lvl5pPr>
+            <a:lvl6pPr eaLnBrk="1" hangingPunct="1">
+              <a:defRPr>
+                <a:solidFill>
+                  <a:schemeClr val="tx2"/>
+                </a:solidFill>
+              </a:defRPr>
+            </a:lvl6pPr>
+            <a:lvl7pPr eaLnBrk="1" hangingPunct="1">
+              <a:defRPr>
+                <a:solidFill>
+                  <a:schemeClr val="tx2"/>
+                </a:solidFill>
+              </a:defRPr>
+            </a:lvl7pPr>
+            <a:lvl8pPr eaLnBrk="1" hangingPunct="1">
+              <a:defRPr>
+                <a:solidFill>
+                  <a:schemeClr val="tx2"/>
+                </a:solidFill>
+              </a:defRPr>
+            </a:lvl8pPr>
+            <a:lvl9pPr eaLnBrk="1" hangingPunct="1">
+              <a:defRPr>
+                <a:solidFill>
+                  <a:schemeClr val="tx2"/>
+                </a:solidFill>
+              </a:defRPr>
+            </a:lvl9pPr>
+          </a:lstStyle>
+          <a:p>
+            <a:pPr algn="ctr"/>
+            <a:r>
+              <a:rPr lang="en-US" sz="2800" b="1" dirty="0" smtClean="0">
+                <a:solidFill>
+                  <a:schemeClr val="tx1"/>
+                </a:solidFill>
+                <a:effectLst>
+                  <a:glow rad="317500">
+                    <a:schemeClr val="accent1">
+                      <a:alpha val="21000"/>
+                    </a:schemeClr>
+                  </a:glow>
+                  <a:outerShdw blurRad="50800" dist="50800" dir="5400000" algn="ctr" rotWithShape="0">
+                    <a:srgbClr val="000000"/>
+                  </a:outerShdw>
+                </a:effectLst>
+                <a:latin typeface="+mn-lt"/>
+              </a:rPr>
+              <a:t>The UNSEEN </a:t>
+            </a:r>
+            <a:r>
+              <a:rPr lang="en-US" sz="2800" b="1" dirty="0">
+                <a:solidFill>
+                  <a:schemeClr val="tx1"/>
+                </a:solidFill>
+                <a:effectLst>
+                  <a:glow rad="317500">
+                    <a:schemeClr val="accent1">
+                      <a:alpha val="21000"/>
+                    </a:schemeClr>
+                  </a:glow>
+                  <a:outerShdw blurRad="50800" dist="50800" dir="5400000" algn="ctr" rotWithShape="0">
+                    <a:srgbClr val="000000"/>
+                  </a:outerShdw>
+                </a:effectLst>
+                <a:latin typeface="+mn-lt"/>
+              </a:rPr>
+              <a:t>MAP of </a:t>
+            </a:r>
+            <a:endParaRPr lang="en-US" sz="2800" b="1" dirty="0" smtClean="0">
+              <a:solidFill>
+                <a:schemeClr val="tx1"/>
+              </a:solidFill>
+              <a:effectLst>
+                <a:glow rad="317500">
+                  <a:schemeClr val="accent1">
+                    <a:alpha val="21000"/>
+                  </a:schemeClr>
+                </a:glow>
+                <a:outerShdw blurRad="50800" dist="50800" dir="5400000" algn="ctr" rotWithShape="0">
+                  <a:srgbClr val="000000"/>
+                </a:outerShdw>
+              </a:effectLst>
+              <a:latin typeface="+mn-lt"/>
+            </a:endParaRPr>
+          </a:p>
+          <a:p>
+            <a:pPr algn="ctr"/>
+            <a:r>
+              <a:rPr lang="en-US" sz="2800" b="1" dirty="0" smtClean="0">
+                <a:solidFill>
+                  <a:schemeClr val="tx1"/>
+                </a:solidFill>
+                <a:effectLst>
+                  <a:glow rad="317500">
+                    <a:schemeClr val="accent1">
+                      <a:alpha val="21000"/>
+                    </a:schemeClr>
+                  </a:glow>
+                  <a:outerShdw blurRad="50800" dist="50800" dir="5400000" algn="ctr" rotWithShape="0">
+                    <a:srgbClr val="000000"/>
+                  </a:outerShdw>
+                </a:effectLst>
+                <a:latin typeface="+mn-lt"/>
+              </a:rPr>
+              <a:t>New York City</a:t>
+            </a:r>
+            <a:endParaRPr lang="en-US" sz="2600" dirty="0">
+              <a:solidFill>
+                <a:schemeClr val="tx1"/>
+              </a:solidFill>
+              <a:effectLst>
+                <a:glow rad="317500">
+                  <a:schemeClr val="accent1">
+                    <a:alpha val="21000"/>
+                  </a:schemeClr>
+                </a:glow>
+                <a:outerShdw blurRad="50800" dist="50800" dir="5400000" algn="ctr" rotWithShape="0">
+                  <a:srgbClr val="000000"/>
+                </a:outerShdw>
+              </a:effectLst>
+              <a:latin typeface="+mn-lt"/>
+            </a:endParaRPr>
+          </a:p>
+        </p:txBody>
+      </p:sp>
+      <p:sp>
+        <p:nvSpPr>
+          <p:cNvPr id="9" name="Title 1">
+            <a:extLst>
+              <a:ext uri="{FF2B5EF4-FFF2-40B4-BE49-F238E27FC236}">
+                <a16:creationId xmlns="" xmlns:a16="http://schemas.microsoft.com/office/drawing/2014/main" id="{AAB0CBC3-D15A-994D-9504-599724A96D06}"/>
+              </a:ext>
+            </a:extLst>
+          </p:cNvPr>
+          <p:cNvSpPr txBox="1">
+            <a:spLocks/>
+          </p:cNvSpPr>
+          <p:nvPr/>
+        </p:nvSpPr>
+        <p:spPr>
+          <a:xfrm>
+            <a:off x="0" y="2809921"/>
+            <a:ext cx="5489348" cy="719960"/>
+          </a:xfrm>
+          <a:prstGeom prst="rect">
+            <a:avLst/>
+          </a:prstGeom>
+        </p:spPr>
+        <p:txBody>
+          <a:bodyPr vert="horz" lIns="91440" tIns="45720" rIns="91440" bIns="45720" rtlCol="0" anchor="t">
+            <a:noAutofit/>
+          </a:bodyPr>
+          <a:lstStyle>
+            <a:lvl1pPr algn="l" defTabSz="457200" rtl="0" eaLnBrk="1" latinLnBrk="0" hangingPunct="1">
+              <a:spcBef>
+                <a:spcPct val="0"/>
+              </a:spcBef>
+              <a:buNone/>
+              <a:defRPr sz="3600" kern="1200">
+                <a:solidFill>
+                  <a:schemeClr val="accent1"/>
+                </a:solidFill>
+                <a:latin typeface="+mj-lt"/>
+                <a:ea typeface="+mj-ea"/>
+                <a:cs typeface="+mj-cs"/>
+              </a:defRPr>
+            </a:lvl1pPr>
+            <a:lvl2pPr eaLnBrk="1" hangingPunct="1">
+              <a:defRPr>
+                <a:solidFill>
+                  <a:schemeClr val="tx2"/>
+                </a:solidFill>
+              </a:defRPr>
+            </a:lvl2pPr>
+            <a:lvl3pPr eaLnBrk="1" hangingPunct="1">
+              <a:defRPr>
+                <a:solidFill>
+                  <a:schemeClr val="tx2"/>
+                </a:solidFill>
+              </a:defRPr>
+            </a:lvl3pPr>
+            <a:lvl4pPr eaLnBrk="1" hangingPunct="1">
+              <a:defRPr>
+                <a:solidFill>
+                  <a:schemeClr val="tx2"/>
+                </a:solidFill>
+              </a:defRPr>
+            </a:lvl4pPr>
+            <a:lvl5pPr eaLnBrk="1" hangingPunct="1">
+              <a:defRPr>
+                <a:solidFill>
+                  <a:schemeClr val="tx2"/>
+                </a:solidFill>
+              </a:defRPr>
+            </a:lvl5pPr>
+            <a:lvl6pPr eaLnBrk="1" hangingPunct="1">
+              <a:defRPr>
+                <a:solidFill>
+                  <a:schemeClr val="tx2"/>
+                </a:solidFill>
+              </a:defRPr>
+            </a:lvl6pPr>
+            <a:lvl7pPr eaLnBrk="1" hangingPunct="1">
+              <a:defRPr>
+                <a:solidFill>
+                  <a:schemeClr val="tx2"/>
+                </a:solidFill>
+              </a:defRPr>
+            </a:lvl7pPr>
+            <a:lvl8pPr eaLnBrk="1" hangingPunct="1">
+              <a:defRPr>
+                <a:solidFill>
+                  <a:schemeClr val="tx2"/>
+                </a:solidFill>
+              </a:defRPr>
+            </a:lvl8pPr>
+            <a:lvl9pPr eaLnBrk="1" hangingPunct="1">
+              <a:defRPr>
+                <a:solidFill>
+                  <a:schemeClr val="tx2"/>
+                </a:solidFill>
+              </a:defRPr>
+            </a:lvl9pPr>
+          </a:lstStyle>
+          <a:p>
+            <a:r>
+              <a:rPr lang="en-US" sz="2200" b="1" dirty="0" smtClean="0">
+                <a:solidFill>
+                  <a:schemeClr val="tx1"/>
+                </a:solidFill>
+                <a:latin typeface="+mn-lt"/>
+              </a:rPr>
+              <a:t>Red NTAs: </a:t>
+            </a:r>
+            <a:r>
+              <a:rPr lang="en-US" sz="2200" dirty="0" smtClean="0">
+                <a:solidFill>
+                  <a:schemeClr val="tx1"/>
+                </a:solidFill>
+                <a:latin typeface="+mn-lt"/>
+              </a:rPr>
+              <a:t>log of # of pick ups </a:t>
+            </a:r>
+            <a:r>
+              <a:rPr lang="en-US" sz="2200" b="1" dirty="0" smtClean="0">
+                <a:solidFill>
+                  <a:schemeClr val="tx1"/>
+                </a:solidFill>
+                <a:latin typeface="+mn-lt"/>
+              </a:rPr>
+              <a:t>&gt;</a:t>
+            </a:r>
+            <a:r>
+              <a:rPr lang="en-US" sz="2200" dirty="0" smtClean="0">
+                <a:solidFill>
+                  <a:schemeClr val="tx1"/>
+                </a:solidFill>
+                <a:latin typeface="+mn-lt"/>
+              </a:rPr>
+              <a:t> thresh.</a:t>
+            </a:r>
+          </a:p>
+          <a:p>
+            <a:r>
+              <a:rPr lang="en-US" sz="2200" b="1" dirty="0" smtClean="0">
+                <a:solidFill>
+                  <a:schemeClr val="tx1"/>
+                </a:solidFill>
+                <a:latin typeface="+mn-lt"/>
+              </a:rPr>
+              <a:t>Yellow NTAs: </a:t>
+            </a:r>
+            <a:r>
+              <a:rPr lang="en-US" sz="2200" dirty="0" smtClean="0">
+                <a:solidFill>
+                  <a:schemeClr val="tx1"/>
+                </a:solidFill>
+              </a:rPr>
+              <a:t>log </a:t>
+            </a:r>
+            <a:r>
+              <a:rPr lang="en-US" sz="2200" dirty="0">
+                <a:solidFill>
+                  <a:schemeClr val="tx1"/>
+                </a:solidFill>
+              </a:rPr>
+              <a:t>of # </a:t>
+            </a:r>
+            <a:r>
+              <a:rPr lang="en-US" sz="2200" dirty="0" smtClean="0">
+                <a:solidFill>
+                  <a:schemeClr val="tx1"/>
+                </a:solidFill>
+              </a:rPr>
+              <a:t>pick </a:t>
+            </a:r>
+            <a:r>
+              <a:rPr lang="en-US" sz="2200" dirty="0">
+                <a:solidFill>
+                  <a:schemeClr val="tx1"/>
+                </a:solidFill>
+              </a:rPr>
+              <a:t>ups </a:t>
+            </a:r>
+            <a:r>
+              <a:rPr lang="en-US" sz="2200" b="1" dirty="0" smtClean="0">
+                <a:solidFill>
+                  <a:schemeClr val="tx1"/>
+                </a:solidFill>
+              </a:rPr>
+              <a:t>&lt;</a:t>
+            </a:r>
+            <a:r>
+              <a:rPr lang="en-US" sz="2200" dirty="0" smtClean="0">
+                <a:solidFill>
+                  <a:schemeClr val="tx1"/>
+                </a:solidFill>
+              </a:rPr>
+              <a:t> </a:t>
+            </a:r>
+            <a:r>
+              <a:rPr lang="en-US" sz="2200" dirty="0">
+                <a:solidFill>
+                  <a:schemeClr val="tx1"/>
+                </a:solidFill>
+              </a:rPr>
+              <a:t>thresh.</a:t>
+            </a:r>
+            <a:endParaRPr lang="en-US" sz="2200" dirty="0">
+              <a:solidFill>
+                <a:schemeClr val="tx1"/>
+              </a:solidFill>
+              <a:latin typeface="+mn-lt"/>
+            </a:endParaRPr>
+          </a:p>
+        </p:txBody>
+      </p:sp>
+      <p:pic>
+        <p:nvPicPr>
+          <p:cNvPr id="11" name="Picture 10"/>
+          <p:cNvPicPr>
+            <a:picLocks noChangeAspect="1"/>
+          </p:cNvPicPr>
+          <p:nvPr/>
+        </p:nvPicPr>
+        <p:blipFill>
+          <a:blip r:embed="rId2">
+            <a:extLst>
+              <a:ext uri="{28A0092B-C50C-407E-A947-70E740481C1C}">
+                <a14:useLocalDpi xmlns:a14="http://schemas.microsoft.com/office/drawing/2010/main" val="0"/>
+              </a:ext>
+            </a:extLst>
+          </a:blip>
+          <a:stretch>
+            <a:fillRect/>
+          </a:stretch>
+        </p:blipFill>
+        <p:spPr>
+          <a:xfrm>
+            <a:off x="5381605" y="183630"/>
+            <a:ext cx="6698474" cy="6436695"/>
+          </a:xfrm>
+          <a:prstGeom prst="rect">
+            <a:avLst/>
+          </a:prstGeom>
+          <a:effectLst>
+            <a:outerShdw blurRad="50800" dist="50800" dir="5400000" algn="ctr" rotWithShape="0">
+              <a:srgbClr val="000000">
+                <a:alpha val="71000"/>
+              </a:srgbClr>
+            </a:outerShdw>
+          </a:effectLst>
+          <a:scene3d>
+            <a:camera prst="orthographicFront"/>
+            <a:lightRig rig="threePt" dir="t"/>
+          </a:scene3d>
+          <a:sp3d>
+            <a:bevelT w="165100" prst="coolSlant"/>
+            <a:bevelB w="165100" prst="coolSlant"/>
+          </a:sp3d>
+        </p:spPr>
+      </p:pic>
+      <p:sp>
+        <p:nvSpPr>
+          <p:cNvPr id="5" name="Rectangle 4"/>
+          <p:cNvSpPr/>
+          <p:nvPr/>
+        </p:nvSpPr>
+        <p:spPr>
+          <a:xfrm>
+            <a:off x="0" y="3926491"/>
+            <a:ext cx="5298234" cy="2031325"/>
+          </a:xfrm>
+          <a:prstGeom prst="rect">
+            <a:avLst/>
+          </a:prstGeom>
+          <a:solidFill>
+            <a:schemeClr val="bg1"/>
+          </a:solidFill>
+        </p:spPr>
+        <p:txBody>
+          <a:bodyPr wrap="square">
+            <a:spAutoFit/>
+          </a:bodyPr>
+          <a:lstStyle/>
+          <a:p>
+            <a:pPr algn="just"/>
+            <a:r>
+              <a:rPr lang="en-US" sz="2300" b="1" dirty="0" smtClean="0"/>
+              <a:t>    The Map reveals:</a:t>
+            </a:r>
+          </a:p>
+          <a:p>
+            <a:pPr algn="just"/>
+            <a:endParaRPr lang="en-US" sz="2300" dirty="0"/>
+          </a:p>
+          <a:p>
+            <a:pPr marL="342900" indent="-342900" algn="just">
+              <a:buFont typeface="Arial" charset="0"/>
+              <a:buChar char="•"/>
+            </a:pPr>
+            <a:r>
+              <a:rPr lang="en-US" sz="2000" dirty="0" smtClean="0"/>
+              <a:t>Possible </a:t>
+            </a:r>
+            <a:r>
+              <a:rPr lang="en-US" sz="2000" dirty="0"/>
+              <a:t>areas unattended by different transportation means (yellow areas). </a:t>
+            </a:r>
+          </a:p>
+          <a:p>
+            <a:pPr marL="342900" indent="-342900" algn="just">
+              <a:buFont typeface="Arial" charset="0"/>
+              <a:buChar char="•"/>
+            </a:pPr>
+            <a:r>
+              <a:rPr lang="en-US" sz="2000" dirty="0"/>
+              <a:t>An idea of people’s mobility choices, depending on where they live. </a:t>
+            </a:r>
+            <a:endParaRPr lang="en-US" sz="2000" dirty="0">
+              <a:effectLst/>
+            </a:endParaRPr>
+          </a:p>
+        </p:txBody>
+      </p:sp>
+    </p:spTree>
+    <p:extLst>
+      <p:ext uri="{BB962C8B-B14F-4D97-AF65-F5344CB8AC3E}">
+        <p14:creationId xmlns:p14="http://schemas.microsoft.com/office/powerpoint/2010/main" val="1743060850"/>
+      </p:ext>
+    </p:extLst>
+  </p:cSld>
+  <p:clrMapOvr>
+    <a:masterClrMapping/>
+  </p:clrMapOvr>
+  <p:timing>
+    <p:tnLst>
+      <p:par>
+        <p:cTn id="1" dur="indefinite" restart="never" nodeType="tmRoot"/>
+      </p:par>
+    </p:tnLst>
+  </p:timing>
+</p:sld>
+</file>
+
+<file path=ppt/slides/slide12.xml><?xml version="1.0" encoding="utf-8"?>
+<p:sld xmlns:a="http://schemas.openxmlformats.org/drawingml/2006/main" xmlns:r="http://schemas.openxmlformats.org/officeDocument/2006/relationships" xmlns:p="http://schemas.openxmlformats.org/presentationml/2006/main">
+  <p:cSld>
+    <p:spTree>
+      <p:nvGrpSpPr>
+        <p:cNvPr id="1" name=""/>
+        <p:cNvGrpSpPr/>
+        <p:nvPr/>
+      </p:nvGrpSpPr>
+      <p:grpSpPr>
+        <a:xfrm>
+          <a:off x="0" y="0"/>
+          <a:ext cx="0" cy="0"/>
+          <a:chOff x="0" y="0"/>
+          <a:chExt cx="0" cy="0"/>
+        </a:xfrm>
+      </p:grpSpPr>
+      <p:sp>
+        <p:nvSpPr>
+          <p:cNvPr id="16" name="Rectangle 15">
+            <a:extLst>
+              <a:ext uri="{FF2B5EF4-FFF2-40B4-BE49-F238E27FC236}">
+                <a16:creationId xmlns="" xmlns:a16="http://schemas.microsoft.com/office/drawing/2014/main" id="{E131166B-4C10-BC44-9967-4AF22CC16AFD}"/>
               </a:ext>
             </a:extLst>
           </p:cNvPr>
@@ -6048,7 +7161,7 @@
           <p:cNvPr id="3" name="Title 1">
             <a:extLst>
               <a:ext uri="{FF2B5EF4-FFF2-40B4-BE49-F238E27FC236}">
-                <a16:creationId xmlns:a16="http://schemas.microsoft.com/office/drawing/2014/main" xmlns="" id="{AAB0CBC3-D15A-994D-9504-599724A96D06}"/>
+                <a16:creationId xmlns="" xmlns:a16="http://schemas.microsoft.com/office/drawing/2014/main" id="{AAB0CBC3-D15A-994D-9504-599724A96D06}"/>
               </a:ext>
             </a:extLst>
           </p:cNvPr>
@@ -6390,10 +7503,17 @@
   <p:clrMapOvr>
     <a:masterClrMapping/>
   </p:clrMapOvr>
+  <p:timing>
+    <p:tnLst>
+      <p:par>
+        <p:cTn id="1" dur="indefinite" restart="never" nodeType="tmRoot"/>
+      </p:par>
+    </p:tnLst>
+  </p:timing>
 </p:sld>
 </file>
 
-<file path=ppt/slides/slide11.xml><?xml version="1.0" encoding="utf-8"?>
+<file path=ppt/slides/slide13.xml><?xml version="1.0" encoding="utf-8"?>
 <p:sld xmlns:a="http://schemas.openxmlformats.org/drawingml/2006/main" xmlns:r="http://schemas.openxmlformats.org/officeDocument/2006/relationships" xmlns:p="http://schemas.openxmlformats.org/presentationml/2006/main">
   <p:cSld>
     <p:spTree>
@@ -6415,7 +7535,7 @@
           <p:cNvPr id="16" name="Rectangle 15">
             <a:extLst>
               <a:ext uri="{FF2B5EF4-FFF2-40B4-BE49-F238E27FC236}">
-                <a16:creationId xmlns:a16="http://schemas.microsoft.com/office/drawing/2014/main" xmlns="" id="{E131166B-4C10-BC44-9967-4AF22CC16AFD}"/>
+                <a16:creationId xmlns="" xmlns:a16="http://schemas.microsoft.com/office/drawing/2014/main" id="{E131166B-4C10-BC44-9967-4AF22CC16AFD}"/>
               </a:ext>
             </a:extLst>
           </p:cNvPr>
@@ -6467,7 +7587,7 @@
           <p:cNvPr id="8" name="Title 1">
             <a:extLst>
               <a:ext uri="{FF2B5EF4-FFF2-40B4-BE49-F238E27FC236}">
-                <a16:creationId xmlns:a16="http://schemas.microsoft.com/office/drawing/2014/main" xmlns="" id="{AAB0CBC3-D15A-994D-9504-599724A96D06}"/>
+                <a16:creationId xmlns="" xmlns:a16="http://schemas.microsoft.com/office/drawing/2014/main" id="{AAB0CBC3-D15A-994D-9504-599724A96D06}"/>
               </a:ext>
             </a:extLst>
           </p:cNvPr>
@@ -6835,7 +7955,7 @@
 </p:sld>
 </file>
 
-<file path=ppt/slides/slide12.xml><?xml version="1.0" encoding="utf-8"?>
+<file path=ppt/slides/slide14.xml><?xml version="1.0" encoding="utf-8"?>
 <p:sld xmlns:a="http://schemas.openxmlformats.org/drawingml/2006/main" xmlns:r="http://schemas.openxmlformats.org/officeDocument/2006/relationships" xmlns:p="http://schemas.openxmlformats.org/presentationml/2006/main">
   <p:cSld>
     <p:spTree>
@@ -6857,7 +7977,7 @@
           <p:cNvPr id="16" name="Rectangle 15">
             <a:extLst>
               <a:ext uri="{FF2B5EF4-FFF2-40B4-BE49-F238E27FC236}">
-                <a16:creationId xmlns:a16="http://schemas.microsoft.com/office/drawing/2014/main" xmlns="" id="{E131166B-4C10-BC44-9967-4AF22CC16AFD}"/>
+                <a16:creationId xmlns="" xmlns:a16="http://schemas.microsoft.com/office/drawing/2014/main" id="{E131166B-4C10-BC44-9967-4AF22CC16AFD}"/>
               </a:ext>
             </a:extLst>
           </p:cNvPr>
@@ -6954,7 +8074,7 @@
           <p:cNvPr id="6" name="Title 1">
             <a:extLst>
               <a:ext uri="{FF2B5EF4-FFF2-40B4-BE49-F238E27FC236}">
-                <a16:creationId xmlns:a16="http://schemas.microsoft.com/office/drawing/2014/main" xmlns="" id="{AAB0CBC3-D15A-994D-9504-599724A96D06}"/>
+                <a16:creationId xmlns="" xmlns:a16="http://schemas.microsoft.com/office/drawing/2014/main" id="{AAB0CBC3-D15A-994D-9504-599724A96D06}"/>
               </a:ext>
             </a:extLst>
           </p:cNvPr>
@@ -7143,7 +8263,7 @@
           <p:cNvPr id="7" name="Title 1">
             <a:extLst>
               <a:ext uri="{FF2B5EF4-FFF2-40B4-BE49-F238E27FC236}">
-                <a16:creationId xmlns:a16="http://schemas.microsoft.com/office/drawing/2014/main" xmlns="" id="{AAB0CBC3-D15A-994D-9504-599724A96D06}"/>
+                <a16:creationId xmlns="" xmlns:a16="http://schemas.microsoft.com/office/drawing/2014/main" id="{AAB0CBC3-D15A-994D-9504-599724A96D06}"/>
               </a:ext>
             </a:extLst>
           </p:cNvPr>
@@ -7346,6 +8466,456 @@
     <p:extLst>
       <p:ext uri="{BB962C8B-B14F-4D97-AF65-F5344CB8AC3E}">
         <p14:creationId xmlns:p14="http://schemas.microsoft.com/office/powerpoint/2010/main" val="851288273"/>
+      </p:ext>
+    </p:extLst>
+  </p:cSld>
+  <p:clrMapOvr>
+    <a:masterClrMapping/>
+  </p:clrMapOvr>
+  <p:timing>
+    <p:tnLst>
+      <p:par>
+        <p:cTn id="1" dur="indefinite" restart="never" nodeType="tmRoot"/>
+      </p:par>
+    </p:tnLst>
+  </p:timing>
+</p:sld>
+</file>
+
+<file path=ppt/slides/slide15.xml><?xml version="1.0" encoding="utf-8"?>
+<p:sld xmlns:a="http://schemas.openxmlformats.org/drawingml/2006/main" xmlns:r="http://schemas.openxmlformats.org/officeDocument/2006/relationships" xmlns:p="http://schemas.openxmlformats.org/presentationml/2006/main">
+  <p:cSld>
+    <p:spTree>
+      <p:nvGrpSpPr>
+        <p:cNvPr id="1" name=""/>
+        <p:cNvGrpSpPr/>
+        <p:nvPr/>
+      </p:nvGrpSpPr>
+      <p:grpSpPr>
+        <a:xfrm>
+          <a:off x="0" y="0"/>
+          <a:ext cx="0" cy="0"/>
+          <a:chOff x="0" y="0"/>
+          <a:chExt cx="0" cy="0"/>
+        </a:xfrm>
+      </p:grpSpPr>
+      <p:sp>
+        <p:nvSpPr>
+          <p:cNvPr id="16" name="Rectangle 15">
+            <a:extLst>
+              <a:ext uri="{FF2B5EF4-FFF2-40B4-BE49-F238E27FC236}">
+                <a16:creationId xmlns="" xmlns:a16="http://schemas.microsoft.com/office/drawing/2014/main" id="{E131166B-4C10-BC44-9967-4AF22CC16AFD}"/>
+              </a:ext>
+            </a:extLst>
+          </p:cNvPr>
+          <p:cNvSpPr/>
+          <p:nvPr/>
+        </p:nvSpPr>
+        <p:spPr>
+          <a:xfrm>
+            <a:off x="8384380" y="0"/>
+            <a:ext cx="3543300" cy="6729676"/>
+          </a:xfrm>
+          <a:prstGeom prst="rect">
+            <a:avLst/>
+          </a:prstGeom>
+          <a:solidFill>
+            <a:schemeClr val="bg1"/>
+          </a:solidFill>
+          <a:ln>
+            <a:noFill/>
+          </a:ln>
+        </p:spPr>
+        <p:style>
+          <a:lnRef idx="2">
+            <a:schemeClr val="accent1">
+              <a:shade val="50000"/>
+            </a:schemeClr>
+          </a:lnRef>
+          <a:fillRef idx="1">
+            <a:schemeClr val="accent1"/>
+          </a:fillRef>
+          <a:effectRef idx="0">
+            <a:schemeClr val="accent1"/>
+          </a:effectRef>
+          <a:fontRef idx="minor">
+            <a:schemeClr val="lt1"/>
+          </a:fontRef>
+        </p:style>
+        <p:txBody>
+          <a:bodyPr rtlCol="0" anchor="ctr"/>
+          <a:lstStyle/>
+          <a:p>
+            <a:pPr algn="ctr"/>
+            <a:endParaRPr lang="en-US"/>
+          </a:p>
+        </p:txBody>
+      </p:sp>
+      <p:pic>
+        <p:nvPicPr>
+          <p:cNvPr id="11" name="Picture 10"/>
+          <p:cNvPicPr>
+            <a:picLocks noChangeAspect="1"/>
+          </p:cNvPicPr>
+          <p:nvPr/>
+        </p:nvPicPr>
+        <p:blipFill>
+          <a:blip r:embed="rId2">
+            <a:extLst>
+              <a:ext uri="{28A0092B-C50C-407E-A947-70E740481C1C}">
+                <a14:useLocalDpi xmlns:a14="http://schemas.microsoft.com/office/drawing/2010/main" val="0"/>
+              </a:ext>
+            </a:extLst>
+          </a:blip>
+          <a:stretch>
+            <a:fillRect/>
+          </a:stretch>
+        </p:blipFill>
+        <p:spPr>
+          <a:xfrm>
+            <a:off x="132937" y="292981"/>
+            <a:ext cx="6698474" cy="6436695"/>
+          </a:xfrm>
+          <a:prstGeom prst="rect">
+            <a:avLst/>
+          </a:prstGeom>
+          <a:effectLst>
+            <a:outerShdw blurRad="50800" dist="50800" dir="5400000" algn="ctr" rotWithShape="0">
+              <a:srgbClr val="000000">
+                <a:alpha val="71000"/>
+              </a:srgbClr>
+            </a:outerShdw>
+          </a:effectLst>
+          <a:scene3d>
+            <a:camera prst="orthographicFront"/>
+            <a:lightRig rig="threePt" dir="t"/>
+          </a:scene3d>
+          <a:sp3d>
+            <a:bevelT w="165100" prst="coolSlant"/>
+            <a:bevelB w="165100" prst="coolSlant"/>
+          </a:sp3d>
+        </p:spPr>
+      </p:pic>
+      <p:sp>
+        <p:nvSpPr>
+          <p:cNvPr id="6" name="Title 1">
+            <a:extLst>
+              <a:ext uri="{FF2B5EF4-FFF2-40B4-BE49-F238E27FC236}">
+                <a16:creationId xmlns="" xmlns:a16="http://schemas.microsoft.com/office/drawing/2014/main" id="{AAB0CBC3-D15A-994D-9504-599724A96D06}"/>
+              </a:ext>
+            </a:extLst>
+          </p:cNvPr>
+          <p:cNvSpPr txBox="1">
+            <a:spLocks/>
+          </p:cNvSpPr>
+          <p:nvPr/>
+        </p:nvSpPr>
+        <p:spPr>
+          <a:xfrm>
+            <a:off x="7050568" y="108236"/>
+            <a:ext cx="4835656" cy="1812849"/>
+          </a:xfrm>
+          <a:prstGeom prst="rect">
+            <a:avLst/>
+          </a:prstGeom>
+        </p:spPr>
+        <p:txBody>
+          <a:bodyPr vert="horz" lIns="91440" tIns="45720" rIns="91440" bIns="45720" rtlCol="0" anchor="t">
+            <a:noAutofit/>
+          </a:bodyPr>
+          <a:lstStyle>
+            <a:lvl1pPr algn="l" defTabSz="457200" rtl="0" eaLnBrk="1" latinLnBrk="0" hangingPunct="1">
+              <a:spcBef>
+                <a:spcPct val="0"/>
+              </a:spcBef>
+              <a:buNone/>
+              <a:defRPr sz="3600" kern="1200">
+                <a:solidFill>
+                  <a:schemeClr val="accent1"/>
+                </a:solidFill>
+                <a:latin typeface="+mj-lt"/>
+                <a:ea typeface="+mj-ea"/>
+                <a:cs typeface="+mj-cs"/>
+              </a:defRPr>
+            </a:lvl1pPr>
+            <a:lvl2pPr eaLnBrk="1" hangingPunct="1">
+              <a:defRPr>
+                <a:solidFill>
+                  <a:schemeClr val="tx2"/>
+                </a:solidFill>
+              </a:defRPr>
+            </a:lvl2pPr>
+            <a:lvl3pPr eaLnBrk="1" hangingPunct="1">
+              <a:defRPr>
+                <a:solidFill>
+                  <a:schemeClr val="tx2"/>
+                </a:solidFill>
+              </a:defRPr>
+            </a:lvl3pPr>
+            <a:lvl4pPr eaLnBrk="1" hangingPunct="1">
+              <a:defRPr>
+                <a:solidFill>
+                  <a:schemeClr val="tx2"/>
+                </a:solidFill>
+              </a:defRPr>
+            </a:lvl4pPr>
+            <a:lvl5pPr eaLnBrk="1" hangingPunct="1">
+              <a:defRPr>
+                <a:solidFill>
+                  <a:schemeClr val="tx2"/>
+                </a:solidFill>
+              </a:defRPr>
+            </a:lvl5pPr>
+            <a:lvl6pPr eaLnBrk="1" hangingPunct="1">
+              <a:defRPr>
+                <a:solidFill>
+                  <a:schemeClr val="tx2"/>
+                </a:solidFill>
+              </a:defRPr>
+            </a:lvl6pPr>
+            <a:lvl7pPr eaLnBrk="1" hangingPunct="1">
+              <a:defRPr>
+                <a:solidFill>
+                  <a:schemeClr val="tx2"/>
+                </a:solidFill>
+              </a:defRPr>
+            </a:lvl7pPr>
+            <a:lvl8pPr eaLnBrk="1" hangingPunct="1">
+              <a:defRPr>
+                <a:solidFill>
+                  <a:schemeClr val="tx2"/>
+                </a:solidFill>
+              </a:defRPr>
+            </a:lvl8pPr>
+            <a:lvl9pPr eaLnBrk="1" hangingPunct="1">
+              <a:defRPr>
+                <a:solidFill>
+                  <a:schemeClr val="tx2"/>
+                </a:solidFill>
+              </a:defRPr>
+            </a:lvl9pPr>
+          </a:lstStyle>
+          <a:p>
+            <a:pPr algn="just"/>
+            <a:r>
+              <a:rPr lang="en-US" sz="2400" b="1" dirty="0" smtClean="0">
+                <a:solidFill>
+                  <a:schemeClr val="tx1"/>
+                </a:solidFill>
+              </a:rPr>
+              <a:t>Model Fitting: </a:t>
+            </a:r>
+          </a:p>
+          <a:p>
+            <a:pPr algn="just"/>
+            <a:endParaRPr lang="en-US" sz="2400" dirty="0">
+              <a:solidFill>
+                <a:schemeClr val="tx1"/>
+              </a:solidFill>
+            </a:endParaRPr>
+          </a:p>
+          <a:p>
+            <a:pPr algn="just"/>
+            <a:r>
+              <a:rPr lang="en-US" sz="2100" dirty="0" smtClean="0">
+                <a:solidFill>
+                  <a:schemeClr val="tx1"/>
+                </a:solidFill>
+              </a:rPr>
+              <a:t>R</a:t>
+            </a:r>
+            <a:r>
+              <a:rPr lang="en-US" sz="2100" dirty="0" smtClean="0">
+                <a:solidFill>
+                  <a:schemeClr val="tx1"/>
+                </a:solidFill>
+              </a:rPr>
+              <a:t>andom Forest model used to predict the Yellow indicator, based on demographic information.</a:t>
+            </a:r>
+            <a:endParaRPr lang="en-US" sz="2100" dirty="0">
+              <a:solidFill>
+                <a:schemeClr val="tx1"/>
+              </a:solidFill>
+            </a:endParaRPr>
+          </a:p>
+        </p:txBody>
+      </p:sp>
+      <p:sp>
+        <p:nvSpPr>
+          <p:cNvPr id="2" name="Rectangle 1"/>
+          <p:cNvSpPr/>
+          <p:nvPr/>
+        </p:nvSpPr>
+        <p:spPr>
+          <a:xfrm>
+            <a:off x="7149389" y="3019221"/>
+            <a:ext cx="4638014" cy="738664"/>
+          </a:xfrm>
+          <a:prstGeom prst="rect">
+            <a:avLst/>
+          </a:prstGeom>
+        </p:spPr>
+        <p:txBody>
+          <a:bodyPr wrap="square">
+            <a:spAutoFit/>
+          </a:bodyPr>
+          <a:lstStyle/>
+          <a:p>
+            <a:pPr algn="just"/>
+            <a:r>
+              <a:rPr lang="en-US" sz="2100" dirty="0" smtClean="0"/>
+              <a:t>The model </a:t>
+            </a:r>
+            <a:r>
+              <a:rPr lang="en-US" sz="2100" b="1" dirty="0" smtClean="0"/>
+              <a:t>could be used to</a:t>
+            </a:r>
+            <a:r>
+              <a:rPr lang="en-US" sz="2100" dirty="0" smtClean="0"/>
+              <a:t> </a:t>
+            </a:r>
+            <a:r>
+              <a:rPr lang="en-US" sz="2100" b="1" dirty="0" smtClean="0"/>
+              <a:t>create</a:t>
+            </a:r>
+            <a:r>
+              <a:rPr lang="en-US" sz="2100" dirty="0" smtClean="0"/>
+              <a:t> </a:t>
+            </a:r>
+            <a:r>
+              <a:rPr lang="en-US" sz="2100" dirty="0"/>
+              <a:t>a </a:t>
+            </a:r>
+            <a:r>
+              <a:rPr lang="en-US" sz="2100" b="1" dirty="0" smtClean="0"/>
+              <a:t>projected coverage map</a:t>
+            </a:r>
+            <a:r>
+              <a:rPr lang="en-US" sz="2100" dirty="0" smtClean="0"/>
+              <a:t>.</a:t>
+            </a:r>
+            <a:endParaRPr lang="en-US" sz="2100" dirty="0"/>
+          </a:p>
+        </p:txBody>
+      </p:sp>
+      <p:sp>
+        <p:nvSpPr>
+          <p:cNvPr id="3" name="Rectangle 2"/>
+          <p:cNvSpPr/>
+          <p:nvPr/>
+        </p:nvSpPr>
+        <p:spPr>
+          <a:xfrm>
+            <a:off x="7050568" y="1953522"/>
+            <a:ext cx="4405312" cy="646331"/>
+          </a:xfrm>
+          <a:prstGeom prst="rect">
+            <a:avLst/>
+          </a:prstGeom>
+        </p:spPr>
+        <p:txBody>
+          <a:bodyPr wrap="square">
+            <a:spAutoFit/>
+          </a:bodyPr>
+          <a:lstStyle/>
+          <a:p>
+            <a:pPr algn="ctr"/>
+            <a:r>
+              <a:rPr lang="en-US" dirty="0" smtClean="0"/>
+              <a:t>Accuracy: 87.72</a:t>
+            </a:r>
+            <a:r>
+              <a:rPr lang="en-US" dirty="0"/>
+              <a:t>% </a:t>
+            </a:r>
+            <a:endParaRPr lang="en-US" dirty="0" smtClean="0"/>
+          </a:p>
+          <a:p>
+            <a:pPr algn="ctr"/>
+            <a:r>
+              <a:rPr lang="en-US" dirty="0" smtClean="0"/>
+              <a:t>Precision: 82.35%</a:t>
+            </a:r>
+            <a:endParaRPr lang="en-US" dirty="0"/>
+          </a:p>
+        </p:txBody>
+      </p:sp>
+      <p:sp>
+        <p:nvSpPr>
+          <p:cNvPr id="8" name="Rectangle 7"/>
+          <p:cNvSpPr/>
+          <p:nvPr/>
+        </p:nvSpPr>
+        <p:spPr>
+          <a:xfrm>
+            <a:off x="7092024" y="3757885"/>
+            <a:ext cx="4835656" cy="2677656"/>
+          </a:xfrm>
+          <a:prstGeom prst="rect">
+            <a:avLst/>
+          </a:prstGeom>
+        </p:spPr>
+        <p:txBody>
+          <a:bodyPr wrap="square">
+            <a:spAutoFit/>
+          </a:bodyPr>
+          <a:lstStyle/>
+          <a:p>
+            <a:endParaRPr lang="en-US" sz="2100" dirty="0" smtClean="0"/>
+          </a:p>
+          <a:p>
+            <a:r>
+              <a:rPr lang="en-US" sz="2100" dirty="0" smtClean="0"/>
+              <a:t>With the aim of analyzing:</a:t>
+            </a:r>
+          </a:p>
+          <a:p>
+            <a:endParaRPr lang="en-US" sz="2100" dirty="0"/>
+          </a:p>
+          <a:p>
+            <a:pPr marL="342900" indent="-342900">
+              <a:buFont typeface="Arial" charset="0"/>
+              <a:buChar char="•"/>
+            </a:pPr>
+            <a:r>
+              <a:rPr lang="en-US" sz="2100" dirty="0" smtClean="0"/>
+              <a:t>If no </a:t>
+            </a:r>
+            <a:r>
+              <a:rPr lang="en-US" sz="2100" dirty="0"/>
+              <a:t>changes are done in terms of mobility, </a:t>
+            </a:r>
+            <a:r>
+              <a:rPr lang="en-US" sz="2100" dirty="0" smtClean="0"/>
+              <a:t>and if </a:t>
+            </a:r>
+            <a:r>
+              <a:rPr lang="en-US" sz="2100" dirty="0"/>
+              <a:t>population </a:t>
+            </a:r>
+            <a:r>
+              <a:rPr lang="en-US" sz="2100" dirty="0" smtClean="0"/>
+              <a:t>and </a:t>
+            </a:r>
+            <a:r>
+              <a:rPr lang="en-US" sz="2100" dirty="0"/>
+              <a:t>demographic information changes, </a:t>
+            </a:r>
+            <a:r>
+              <a:rPr lang="en-US" sz="2100" b="1" dirty="0"/>
+              <a:t>how do those changes affect the coverage</a:t>
+            </a:r>
+            <a:r>
+              <a:rPr lang="en-US" sz="2100" dirty="0"/>
+              <a:t>. </a:t>
+            </a:r>
+          </a:p>
+        </p:txBody>
+      </p:sp>
+    </p:spTree>
+    <p:extLst>
+      <p:ext uri="{BB962C8B-B14F-4D97-AF65-F5344CB8AC3E}">
+        <p14:creationId xmlns:p14="http://schemas.microsoft.com/office/powerpoint/2010/main" val="1158093274"/>
       </p:ext>
     </p:extLst>
   </p:cSld>
@@ -7384,7 +8954,7 @@
           <p:cNvPr id="16" name="Rectangle 15">
             <a:extLst>
               <a:ext uri="{FF2B5EF4-FFF2-40B4-BE49-F238E27FC236}">
-                <a16:creationId xmlns:a16="http://schemas.microsoft.com/office/drawing/2014/main" xmlns="" id="{E131166B-4C10-BC44-9967-4AF22CC16AFD}"/>
+                <a16:creationId xmlns="" xmlns:a16="http://schemas.microsoft.com/office/drawing/2014/main" id="{E131166B-4C10-BC44-9967-4AF22CC16AFD}"/>
               </a:ext>
             </a:extLst>
           </p:cNvPr>
@@ -7436,7 +9006,7 @@
           <p:cNvPr id="3" name="Title 1">
             <a:extLst>
               <a:ext uri="{FF2B5EF4-FFF2-40B4-BE49-F238E27FC236}">
-                <a16:creationId xmlns:a16="http://schemas.microsoft.com/office/drawing/2014/main" xmlns="" id="{AAB0CBC3-D15A-994D-9504-599724A96D06}"/>
+                <a16:creationId xmlns="" xmlns:a16="http://schemas.microsoft.com/office/drawing/2014/main" id="{AAB0CBC3-D15A-994D-9504-599724A96D06}"/>
               </a:ext>
             </a:extLst>
           </p:cNvPr>
@@ -7548,7 +9118,7 @@
           <p:cNvPr id="6" name="TextBox 5">
             <a:extLst>
               <a:ext uri="{FF2B5EF4-FFF2-40B4-BE49-F238E27FC236}">
-                <a16:creationId xmlns:a16="http://schemas.microsoft.com/office/drawing/2014/main" xmlns="" id="{13C38C5B-CB66-9F40-A17E-20E8B45AC6B0}"/>
+                <a16:creationId xmlns="" xmlns:a16="http://schemas.microsoft.com/office/drawing/2014/main" id="{13C38C5B-CB66-9F40-A17E-20E8B45AC6B0}"/>
               </a:ext>
             </a:extLst>
           </p:cNvPr>
@@ -7584,7 +9154,7 @@
                 <a:hlinkClick r:id="rId2">
                   <a:extLst>
                     <a:ext uri="{A12FA001-AC4F-418D-AE19-62706E023703}">
-                      <ahyp:hlinkClr xmlns:ahyp="http://schemas.microsoft.com/office/drawing/2018/hyperlinkcolor" xmlns="" val="tx"/>
+                      <ahyp:hlinkClr xmlns="" xmlns:ahyp="http://schemas.microsoft.com/office/drawing/2018/hyperlinkcolor" val="tx"/>
                     </a:ext>
                   </a:extLst>
                 </a:hlinkClick>
@@ -7600,7 +9170,7 @@
                 <a:hlinkClick r:id="rId3">
                   <a:extLst>
                     <a:ext uri="{A12FA001-AC4F-418D-AE19-62706E023703}">
-                      <ahyp:hlinkClr xmlns:ahyp="http://schemas.microsoft.com/office/drawing/2018/hyperlinkcolor" xmlns="" val="tx"/>
+                      <ahyp:hlinkClr xmlns="" xmlns:ahyp="http://schemas.microsoft.com/office/drawing/2018/hyperlinkcolor" val="tx"/>
                     </a:ext>
                   </a:extLst>
                 </a:hlinkClick>
@@ -7616,7 +9186,7 @@
                 <a:hlinkClick r:id="rId4">
                   <a:extLst>
                     <a:ext uri="{A12FA001-AC4F-418D-AE19-62706E023703}">
-                      <ahyp:hlinkClr xmlns:ahyp="http://schemas.microsoft.com/office/drawing/2018/hyperlinkcolor" xmlns="" val="tx"/>
+                      <ahyp:hlinkClr xmlns="" xmlns:ahyp="http://schemas.microsoft.com/office/drawing/2018/hyperlinkcolor" val="tx"/>
                     </a:ext>
                   </a:extLst>
                 </a:hlinkClick>
@@ -7632,7 +9202,7 @@
           <p:cNvPr id="17" name="Group 16">
             <a:extLst>
               <a:ext uri="{FF2B5EF4-FFF2-40B4-BE49-F238E27FC236}">
-                <a16:creationId xmlns:a16="http://schemas.microsoft.com/office/drawing/2014/main" xmlns="" id="{E399A926-42F2-3945-802F-34F7FF5F7955}"/>
+                <a16:creationId xmlns="" xmlns:a16="http://schemas.microsoft.com/office/drawing/2014/main" id="{E399A926-42F2-3945-802F-34F7FF5F7955}"/>
               </a:ext>
             </a:extLst>
           </p:cNvPr>
@@ -7652,7 +9222,7 @@
             <p:cNvPr id="11" name="Picture 10">
               <a:extLst>
                 <a:ext uri="{FF2B5EF4-FFF2-40B4-BE49-F238E27FC236}">
-                  <a16:creationId xmlns:a16="http://schemas.microsoft.com/office/drawing/2014/main" xmlns="" id="{AB8BB0E5-2D4D-5D48-A053-72ACEA51265F}"/>
+                  <a16:creationId xmlns="" xmlns:a16="http://schemas.microsoft.com/office/drawing/2014/main" id="{AB8BB0E5-2D4D-5D48-A053-72ACEA51265F}"/>
                 </a:ext>
               </a:extLst>
             </p:cNvPr>
@@ -7681,7 +9251,7 @@
             <p:cNvPr id="13" name="Picture 12">
               <a:extLst>
                 <a:ext uri="{FF2B5EF4-FFF2-40B4-BE49-F238E27FC236}">
-                  <a16:creationId xmlns:a16="http://schemas.microsoft.com/office/drawing/2014/main" xmlns="" id="{1C8D6CF7-FF4F-5644-B45F-42B436E86E4A}"/>
+                  <a16:creationId xmlns="" xmlns:a16="http://schemas.microsoft.com/office/drawing/2014/main" id="{1C8D6CF7-FF4F-5644-B45F-42B436E86E4A}"/>
                 </a:ext>
               </a:extLst>
             </p:cNvPr>
@@ -7711,7 +9281,7 @@
             <p:cNvPr id="15" name="Picture 14">
               <a:extLst>
                 <a:ext uri="{FF2B5EF4-FFF2-40B4-BE49-F238E27FC236}">
-                  <a16:creationId xmlns:a16="http://schemas.microsoft.com/office/drawing/2014/main" xmlns="" id="{D588BB44-D96A-6F44-AFEC-35EC0194E448}"/>
+                  <a16:creationId xmlns="" xmlns:a16="http://schemas.microsoft.com/office/drawing/2014/main" id="{D588BB44-D96A-6F44-AFEC-35EC0194E448}"/>
                 </a:ext>
               </a:extLst>
             </p:cNvPr>
@@ -7741,7 +9311,7 @@
           <p:cNvPr id="18" name="TextBox 17">
             <a:extLst>
               <a:ext uri="{FF2B5EF4-FFF2-40B4-BE49-F238E27FC236}">
-                <a16:creationId xmlns:a16="http://schemas.microsoft.com/office/drawing/2014/main" xmlns="" id="{E6D7C460-F53B-C345-BA40-F66CCC496218}"/>
+                <a16:creationId xmlns="" xmlns:a16="http://schemas.microsoft.com/office/drawing/2014/main" id="{E6D7C460-F53B-C345-BA40-F66CCC496218}"/>
               </a:ext>
             </a:extLst>
           </p:cNvPr>
@@ -7822,7 +9392,7 @@
           <p:cNvPr id="20" name="TextBox 19">
             <a:extLst>
               <a:ext uri="{FF2B5EF4-FFF2-40B4-BE49-F238E27FC236}">
-                <a16:creationId xmlns:a16="http://schemas.microsoft.com/office/drawing/2014/main" xmlns="" id="{698D5010-7E0C-E84B-B07A-3E92F62581AD}"/>
+                <a16:creationId xmlns="" xmlns:a16="http://schemas.microsoft.com/office/drawing/2014/main" id="{698D5010-7E0C-E84B-B07A-3E92F62581AD}"/>
               </a:ext>
             </a:extLst>
           </p:cNvPr>
@@ -7919,7 +9489,7 @@
           <p:cNvPr id="21" name="TextBox 20">
             <a:extLst>
               <a:ext uri="{FF2B5EF4-FFF2-40B4-BE49-F238E27FC236}">
-                <a16:creationId xmlns:a16="http://schemas.microsoft.com/office/drawing/2014/main" xmlns="" id="{3E68131B-3447-094F-B54C-43DA273D9A3F}"/>
+                <a16:creationId xmlns="" xmlns:a16="http://schemas.microsoft.com/office/drawing/2014/main" id="{3E68131B-3447-094F-B54C-43DA273D9A3F}"/>
               </a:ext>
             </a:extLst>
           </p:cNvPr>
@@ -7972,7 +9542,7 @@
           <p:cNvPr id="22" name="TextBox 21">
             <a:extLst>
               <a:ext uri="{FF2B5EF4-FFF2-40B4-BE49-F238E27FC236}">
-                <a16:creationId xmlns:a16="http://schemas.microsoft.com/office/drawing/2014/main" xmlns="" id="{98FBD958-C1BE-FC4E-A917-739F6C70C03A}"/>
+                <a16:creationId xmlns="" xmlns:a16="http://schemas.microsoft.com/office/drawing/2014/main" id="{98FBD958-C1BE-FC4E-A917-739F6C70C03A}"/>
               </a:ext>
             </a:extLst>
           </p:cNvPr>
@@ -8079,6 +9649,13 @@
   <p:clrMapOvr>
     <a:masterClrMapping/>
   </p:clrMapOvr>
+  <p:timing>
+    <p:tnLst>
+      <p:par>
+        <p:cTn id="1" dur="indefinite" restart="never" nodeType="tmRoot"/>
+      </p:par>
+    </p:tnLst>
+  </p:timing>
 </p:sld>
 </file>
 
@@ -8104,7 +9681,7 @@
           <p:cNvPr id="5" name="Rectangle 4">
             <a:extLst>
               <a:ext uri="{FF2B5EF4-FFF2-40B4-BE49-F238E27FC236}">
-                <a16:creationId xmlns:a16="http://schemas.microsoft.com/office/drawing/2014/main" xmlns="" id="{E131166B-4C10-BC44-9967-4AF22CC16AFD}"/>
+                <a16:creationId xmlns="" xmlns:a16="http://schemas.microsoft.com/office/drawing/2014/main" id="{E131166B-4C10-BC44-9967-4AF22CC16AFD}"/>
               </a:ext>
             </a:extLst>
           </p:cNvPr>
@@ -8156,7 +9733,7 @@
           <p:cNvPr id="2" name="TextBox 1">
             <a:extLst>
               <a:ext uri="{FF2B5EF4-FFF2-40B4-BE49-F238E27FC236}">
-                <a16:creationId xmlns:a16="http://schemas.microsoft.com/office/drawing/2014/main" xmlns="" id="{A7802431-D068-3F47-A98D-FB18984EDCE6}"/>
+                <a16:creationId xmlns="" xmlns:a16="http://schemas.microsoft.com/office/drawing/2014/main" id="{A7802431-D068-3F47-A98D-FB18984EDCE6}"/>
               </a:ext>
             </a:extLst>
           </p:cNvPr>
@@ -8221,7 +9798,7 @@
           <p:cNvPr id="3" name="Title 1">
             <a:extLst>
               <a:ext uri="{FF2B5EF4-FFF2-40B4-BE49-F238E27FC236}">
-                <a16:creationId xmlns:a16="http://schemas.microsoft.com/office/drawing/2014/main" xmlns="" id="{AAB0CBC3-D15A-994D-9504-599724A96D06}"/>
+                <a16:creationId xmlns="" xmlns:a16="http://schemas.microsoft.com/office/drawing/2014/main" id="{AAB0CBC3-D15A-994D-9504-599724A96D06}"/>
               </a:ext>
             </a:extLst>
           </p:cNvPr>
@@ -8333,7 +9910,7 @@
           <p:cNvPr id="4" name="TextBox 3">
             <a:extLst>
               <a:ext uri="{FF2B5EF4-FFF2-40B4-BE49-F238E27FC236}">
-                <a16:creationId xmlns:a16="http://schemas.microsoft.com/office/drawing/2014/main" xmlns="" id="{B9549075-C767-DC41-A007-CD236CFF3ACF}"/>
+                <a16:creationId xmlns="" xmlns:a16="http://schemas.microsoft.com/office/drawing/2014/main" id="{B9549075-C767-DC41-A007-CD236CFF3ACF}"/>
               </a:ext>
             </a:extLst>
           </p:cNvPr>
@@ -8382,6 +9959,13 @@
   <p:clrMapOvr>
     <a:masterClrMapping/>
   </p:clrMapOvr>
+  <p:timing>
+    <p:tnLst>
+      <p:par>
+        <p:cTn id="1" dur="indefinite" restart="never" nodeType="tmRoot"/>
+      </p:par>
+    </p:tnLst>
+  </p:timing>
 </p:sld>
 </file>
 
@@ -8407,7 +9991,7 @@
           <p:cNvPr id="6" name="Rectangle 5">
             <a:extLst>
               <a:ext uri="{FF2B5EF4-FFF2-40B4-BE49-F238E27FC236}">
-                <a16:creationId xmlns:a16="http://schemas.microsoft.com/office/drawing/2014/main" xmlns="" id="{E131166B-4C10-BC44-9967-4AF22CC16AFD}"/>
+                <a16:creationId xmlns="" xmlns:a16="http://schemas.microsoft.com/office/drawing/2014/main" id="{E131166B-4C10-BC44-9967-4AF22CC16AFD}"/>
               </a:ext>
             </a:extLst>
           </p:cNvPr>
@@ -8459,7 +10043,7 @@
           <p:cNvPr id="3" name="Title 1">
             <a:extLst>
               <a:ext uri="{FF2B5EF4-FFF2-40B4-BE49-F238E27FC236}">
-                <a16:creationId xmlns:a16="http://schemas.microsoft.com/office/drawing/2014/main" xmlns="" id="{AAB0CBC3-D15A-994D-9504-599724A96D06}"/>
+                <a16:creationId xmlns="" xmlns:a16="http://schemas.microsoft.com/office/drawing/2014/main" id="{AAB0CBC3-D15A-994D-9504-599724A96D06}"/>
               </a:ext>
             </a:extLst>
           </p:cNvPr>
@@ -8571,7 +10155,7 @@
           <p:cNvPr id="4" name="TextBox 3">
             <a:extLst>
               <a:ext uri="{FF2B5EF4-FFF2-40B4-BE49-F238E27FC236}">
-                <a16:creationId xmlns:a16="http://schemas.microsoft.com/office/drawing/2014/main" xmlns="" id="{B9549075-C767-DC41-A007-CD236CFF3ACF}"/>
+                <a16:creationId xmlns="" xmlns:a16="http://schemas.microsoft.com/office/drawing/2014/main" id="{B9549075-C767-DC41-A007-CD236CFF3ACF}"/>
               </a:ext>
             </a:extLst>
           </p:cNvPr>
@@ -8610,7 +10194,7 @@
           <p:cNvPr id="5" name="TextBox 4">
             <a:extLst>
               <a:ext uri="{FF2B5EF4-FFF2-40B4-BE49-F238E27FC236}">
-                <a16:creationId xmlns:a16="http://schemas.microsoft.com/office/drawing/2014/main" xmlns="" id="{B9549075-C767-DC41-A007-CD236CFF3ACF}"/>
+                <a16:creationId xmlns="" xmlns:a16="http://schemas.microsoft.com/office/drawing/2014/main" id="{B9549075-C767-DC41-A007-CD236CFF3ACF}"/>
               </a:ext>
             </a:extLst>
           </p:cNvPr>
@@ -8649,7 +10233,7 @@
           <p:cNvPr id="7" name="TextBox 6">
             <a:extLst>
               <a:ext uri="{FF2B5EF4-FFF2-40B4-BE49-F238E27FC236}">
-                <a16:creationId xmlns:a16="http://schemas.microsoft.com/office/drawing/2014/main" xmlns="" id="{B9549075-C767-DC41-A007-CD236CFF3ACF}"/>
+                <a16:creationId xmlns="" xmlns:a16="http://schemas.microsoft.com/office/drawing/2014/main" id="{B9549075-C767-DC41-A007-CD236CFF3ACF}"/>
               </a:ext>
             </a:extLst>
           </p:cNvPr>
@@ -8688,7 +10272,7 @@
           <p:cNvPr id="8" name="TextBox 7">
             <a:extLst>
               <a:ext uri="{FF2B5EF4-FFF2-40B4-BE49-F238E27FC236}">
-                <a16:creationId xmlns:a16="http://schemas.microsoft.com/office/drawing/2014/main" xmlns="" id="{B9549075-C767-DC41-A007-CD236CFF3ACF}"/>
+                <a16:creationId xmlns="" xmlns:a16="http://schemas.microsoft.com/office/drawing/2014/main" id="{B9549075-C767-DC41-A007-CD236CFF3ACF}"/>
               </a:ext>
             </a:extLst>
           </p:cNvPr>
@@ -8840,6 +10424,13 @@
   <p:clrMapOvr>
     <a:masterClrMapping/>
   </p:clrMapOvr>
+  <p:timing>
+    <p:tnLst>
+      <p:par>
+        <p:cTn id="1" dur="indefinite" restart="never" nodeType="tmRoot"/>
+      </p:par>
+    </p:tnLst>
+  </p:timing>
 </p:sld>
 </file>
 
@@ -8865,7 +10456,7 @@
           <p:cNvPr id="16" name="Rectangle 15">
             <a:extLst>
               <a:ext uri="{FF2B5EF4-FFF2-40B4-BE49-F238E27FC236}">
-                <a16:creationId xmlns:a16="http://schemas.microsoft.com/office/drawing/2014/main" xmlns="" id="{E131166B-4C10-BC44-9967-4AF22CC16AFD}"/>
+                <a16:creationId xmlns="" xmlns:a16="http://schemas.microsoft.com/office/drawing/2014/main" id="{E131166B-4C10-BC44-9967-4AF22CC16AFD}"/>
               </a:ext>
             </a:extLst>
           </p:cNvPr>
@@ -8917,7 +10508,7 @@
           <p:cNvPr id="3" name="Title 1">
             <a:extLst>
               <a:ext uri="{FF2B5EF4-FFF2-40B4-BE49-F238E27FC236}">
-                <a16:creationId xmlns:a16="http://schemas.microsoft.com/office/drawing/2014/main" xmlns="" id="{AAB0CBC3-D15A-994D-9504-599724A96D06}"/>
+                <a16:creationId xmlns="" xmlns:a16="http://schemas.microsoft.com/office/drawing/2014/main" id="{AAB0CBC3-D15A-994D-9504-599724A96D06}"/>
               </a:ext>
             </a:extLst>
           </p:cNvPr>
@@ -9029,7 +10620,7 @@
           <p:cNvPr id="14" name="Title 1">
             <a:extLst>
               <a:ext uri="{FF2B5EF4-FFF2-40B4-BE49-F238E27FC236}">
-                <a16:creationId xmlns:a16="http://schemas.microsoft.com/office/drawing/2014/main" xmlns="" id="{5D5169D6-0A70-5F4C-80B4-BE6DCD491A4B}"/>
+                <a16:creationId xmlns="" xmlns:a16="http://schemas.microsoft.com/office/drawing/2014/main" id="{5D5169D6-0A70-5F4C-80B4-BE6DCD491A4B}"/>
               </a:ext>
             </a:extLst>
           </p:cNvPr>
@@ -9384,6 +10975,13 @@
   <p:clrMapOvr>
     <a:masterClrMapping/>
   </p:clrMapOvr>
+  <p:timing>
+    <p:tnLst>
+      <p:par>
+        <p:cTn id="1" dur="indefinite" restart="never" nodeType="tmRoot"/>
+      </p:par>
+    </p:tnLst>
+  </p:timing>
 </p:sld>
 </file>
 
@@ -9409,7 +11007,7 @@
           <p:cNvPr id="16" name="Rectangle 15">
             <a:extLst>
               <a:ext uri="{FF2B5EF4-FFF2-40B4-BE49-F238E27FC236}">
-                <a16:creationId xmlns:a16="http://schemas.microsoft.com/office/drawing/2014/main" xmlns="" id="{E131166B-4C10-BC44-9967-4AF22CC16AFD}"/>
+                <a16:creationId xmlns="" xmlns:a16="http://schemas.microsoft.com/office/drawing/2014/main" id="{E131166B-4C10-BC44-9967-4AF22CC16AFD}"/>
               </a:ext>
             </a:extLst>
           </p:cNvPr>
@@ -9461,7 +11059,7 @@
           <p:cNvPr id="3" name="Title 1">
             <a:extLst>
               <a:ext uri="{FF2B5EF4-FFF2-40B4-BE49-F238E27FC236}">
-                <a16:creationId xmlns:a16="http://schemas.microsoft.com/office/drawing/2014/main" xmlns="" id="{AAB0CBC3-D15A-994D-9504-599724A96D06}"/>
+                <a16:creationId xmlns="" xmlns:a16="http://schemas.microsoft.com/office/drawing/2014/main" id="{AAB0CBC3-D15A-994D-9504-599724A96D06}"/>
               </a:ext>
             </a:extLst>
           </p:cNvPr>
@@ -9573,7 +11171,7 @@
           <p:cNvPr id="14" name="Title 1">
             <a:extLst>
               <a:ext uri="{FF2B5EF4-FFF2-40B4-BE49-F238E27FC236}">
-                <a16:creationId xmlns:a16="http://schemas.microsoft.com/office/drawing/2014/main" xmlns="" id="{5D5169D6-0A70-5F4C-80B4-BE6DCD491A4B}"/>
+                <a16:creationId xmlns="" xmlns:a16="http://schemas.microsoft.com/office/drawing/2014/main" id="{5D5169D6-0A70-5F4C-80B4-BE6DCD491A4B}"/>
               </a:ext>
             </a:extLst>
           </p:cNvPr>
@@ -9836,7 +11434,7 @@
           <p:cNvPr id="12" name="Title 1">
             <a:extLst>
               <a:ext uri="{FF2B5EF4-FFF2-40B4-BE49-F238E27FC236}">
-                <a16:creationId xmlns:a16="http://schemas.microsoft.com/office/drawing/2014/main" xmlns="" id="{5D5169D6-0A70-5F4C-80B4-BE6DCD491A4B}"/>
+                <a16:creationId xmlns="" xmlns:a16="http://schemas.microsoft.com/office/drawing/2014/main" id="{5D5169D6-0A70-5F4C-80B4-BE6DCD491A4B}"/>
               </a:ext>
             </a:extLst>
           </p:cNvPr>
@@ -10073,6 +11671,13 @@
   <p:clrMapOvr>
     <a:masterClrMapping/>
   </p:clrMapOvr>
+  <p:timing>
+    <p:tnLst>
+      <p:par>
+        <p:cTn id="1" dur="indefinite" restart="never" nodeType="tmRoot"/>
+      </p:par>
+    </p:tnLst>
+  </p:timing>
 </p:sld>
 </file>
 
@@ -10098,7 +11703,7 @@
           <p:cNvPr id="16" name="Rectangle 15">
             <a:extLst>
               <a:ext uri="{FF2B5EF4-FFF2-40B4-BE49-F238E27FC236}">
-                <a16:creationId xmlns:a16="http://schemas.microsoft.com/office/drawing/2014/main" xmlns="" id="{E131166B-4C10-BC44-9967-4AF22CC16AFD}"/>
+                <a16:creationId xmlns="" xmlns:a16="http://schemas.microsoft.com/office/drawing/2014/main" id="{E131166B-4C10-BC44-9967-4AF22CC16AFD}"/>
               </a:ext>
             </a:extLst>
           </p:cNvPr>
@@ -10150,7 +11755,7 @@
           <p:cNvPr id="3" name="Title 1">
             <a:extLst>
               <a:ext uri="{FF2B5EF4-FFF2-40B4-BE49-F238E27FC236}">
-                <a16:creationId xmlns:a16="http://schemas.microsoft.com/office/drawing/2014/main" xmlns="" id="{AAB0CBC3-D15A-994D-9504-599724A96D06}"/>
+                <a16:creationId xmlns="" xmlns:a16="http://schemas.microsoft.com/office/drawing/2014/main" id="{AAB0CBC3-D15A-994D-9504-599724A96D06}"/>
               </a:ext>
             </a:extLst>
           </p:cNvPr>
@@ -10322,7 +11927,7 @@
           <p:cNvPr id="7" name="Title 1">
             <a:extLst>
               <a:ext uri="{FF2B5EF4-FFF2-40B4-BE49-F238E27FC236}">
-                <a16:creationId xmlns:a16="http://schemas.microsoft.com/office/drawing/2014/main" xmlns="" id="{5D5169D6-0A70-5F4C-80B4-BE6DCD491A4B}"/>
+                <a16:creationId xmlns="" xmlns:a16="http://schemas.microsoft.com/office/drawing/2014/main" id="{5D5169D6-0A70-5F4C-80B4-BE6DCD491A4B}"/>
               </a:ext>
             </a:extLst>
           </p:cNvPr>
@@ -10458,7 +12063,7 @@
           <p:cNvPr id="8" name="Title 1">
             <a:extLst>
               <a:ext uri="{FF2B5EF4-FFF2-40B4-BE49-F238E27FC236}">
-                <a16:creationId xmlns:a16="http://schemas.microsoft.com/office/drawing/2014/main" xmlns="" id="{5D5169D6-0A70-5F4C-80B4-BE6DCD491A4B}"/>
+                <a16:creationId xmlns="" xmlns:a16="http://schemas.microsoft.com/office/drawing/2014/main" id="{5D5169D6-0A70-5F4C-80B4-BE6DCD491A4B}"/>
               </a:ext>
             </a:extLst>
           </p:cNvPr>
@@ -10599,6 +12204,13 @@
   <p:clrMapOvr>
     <a:masterClrMapping/>
   </p:clrMapOvr>
+  <p:timing>
+    <p:tnLst>
+      <p:par>
+        <p:cTn id="1" dur="indefinite" restart="never" nodeType="tmRoot"/>
+      </p:par>
+    </p:tnLst>
+  </p:timing>
 </p:sld>
 </file>
 
@@ -10624,7 +12236,7 @@
           <p:cNvPr id="16" name="Rectangle 15">
             <a:extLst>
               <a:ext uri="{FF2B5EF4-FFF2-40B4-BE49-F238E27FC236}">
-                <a16:creationId xmlns:a16="http://schemas.microsoft.com/office/drawing/2014/main" xmlns="" id="{E131166B-4C10-BC44-9967-4AF22CC16AFD}"/>
+                <a16:creationId xmlns="" xmlns:a16="http://schemas.microsoft.com/office/drawing/2014/main" id="{E131166B-4C10-BC44-9967-4AF22CC16AFD}"/>
               </a:ext>
             </a:extLst>
           </p:cNvPr>
@@ -10676,7 +12288,7 @@
           <p:cNvPr id="3" name="Title 1">
             <a:extLst>
               <a:ext uri="{FF2B5EF4-FFF2-40B4-BE49-F238E27FC236}">
-                <a16:creationId xmlns:a16="http://schemas.microsoft.com/office/drawing/2014/main" xmlns="" id="{AAB0CBC3-D15A-994D-9504-599724A96D06}"/>
+                <a16:creationId xmlns="" xmlns:a16="http://schemas.microsoft.com/office/drawing/2014/main" id="{AAB0CBC3-D15A-994D-9504-599724A96D06}"/>
               </a:ext>
             </a:extLst>
           </p:cNvPr>
@@ -10788,7 +12400,7 @@
           <p:cNvPr id="7" name="Title 1">
             <a:extLst>
               <a:ext uri="{FF2B5EF4-FFF2-40B4-BE49-F238E27FC236}">
-                <a16:creationId xmlns:a16="http://schemas.microsoft.com/office/drawing/2014/main" xmlns="" id="{5D5169D6-0A70-5F4C-80B4-BE6DCD491A4B}"/>
+                <a16:creationId xmlns="" xmlns:a16="http://schemas.microsoft.com/office/drawing/2014/main" id="{5D5169D6-0A70-5F4C-80B4-BE6DCD491A4B}"/>
               </a:ext>
             </a:extLst>
           </p:cNvPr>
@@ -11023,7 +12635,7 @@
           <p:cNvPr id="11" name="Title 1">
             <a:extLst>
               <a:ext uri="{FF2B5EF4-FFF2-40B4-BE49-F238E27FC236}">
-                <a16:creationId xmlns:a16="http://schemas.microsoft.com/office/drawing/2014/main" xmlns="" id="{5D5169D6-0A70-5F4C-80B4-BE6DCD491A4B}"/>
+                <a16:creationId xmlns="" xmlns:a16="http://schemas.microsoft.com/office/drawing/2014/main" id="{5D5169D6-0A70-5F4C-80B4-BE6DCD491A4B}"/>
               </a:ext>
             </a:extLst>
           </p:cNvPr>
@@ -11134,7 +12746,7 @@
           <p:cNvPr id="13" name="Title 1">
             <a:extLst>
               <a:ext uri="{FF2B5EF4-FFF2-40B4-BE49-F238E27FC236}">
-                <a16:creationId xmlns:a16="http://schemas.microsoft.com/office/drawing/2014/main" xmlns="" id="{5D5169D6-0A70-5F4C-80B4-BE6DCD491A4B}"/>
+                <a16:creationId xmlns="" xmlns:a16="http://schemas.microsoft.com/office/drawing/2014/main" id="{5D5169D6-0A70-5F4C-80B4-BE6DCD491A4B}"/>
               </a:ext>
             </a:extLst>
           </p:cNvPr>
@@ -11323,7 +12935,7 @@
           <p:cNvPr id="16" name="Rectangle 15">
             <a:extLst>
               <a:ext uri="{FF2B5EF4-FFF2-40B4-BE49-F238E27FC236}">
-                <a16:creationId xmlns:a16="http://schemas.microsoft.com/office/drawing/2014/main" xmlns="" id="{E131166B-4C10-BC44-9967-4AF22CC16AFD}"/>
+                <a16:creationId xmlns="" xmlns:a16="http://schemas.microsoft.com/office/drawing/2014/main" id="{E131166B-4C10-BC44-9967-4AF22CC16AFD}"/>
               </a:ext>
             </a:extLst>
           </p:cNvPr>
@@ -11332,7 +12944,7 @@
         </p:nvSpPr>
         <p:spPr>
           <a:xfrm>
-            <a:off x="8384380" y="421305"/>
+            <a:off x="8415558" y="1115488"/>
             <a:ext cx="3543300" cy="5724285"/>
           </a:xfrm>
           <a:prstGeom prst="rect">
@@ -11375,7 +12987,7 @@
           <p:cNvPr id="3" name="Title 1">
             <a:extLst>
               <a:ext uri="{FF2B5EF4-FFF2-40B4-BE49-F238E27FC236}">
-                <a16:creationId xmlns:a16="http://schemas.microsoft.com/office/drawing/2014/main" xmlns="" id="{AAB0CBC3-D15A-994D-9504-599724A96D06}"/>
+                <a16:creationId xmlns="" xmlns:a16="http://schemas.microsoft.com/office/drawing/2014/main" id="{AAB0CBC3-D15A-994D-9504-599724A96D06}"/>
               </a:ext>
             </a:extLst>
           </p:cNvPr>
@@ -11386,8 +12998,8 @@
         </p:nvSpPr>
         <p:spPr>
           <a:xfrm>
-            <a:off x="443256" y="0"/>
-            <a:ext cx="3957639" cy="671513"/>
+            <a:off x="885824" y="-36418"/>
+            <a:ext cx="8415339" cy="671513"/>
           </a:xfrm>
           <a:prstGeom prst="rect">
             <a:avLst/>
@@ -11472,20 +13084,12 @@
           <a:p>
             <a:pPr algn="ctr"/>
             <a:r>
-              <a:rPr lang="en-US" sz="4900" b="1" dirty="0">
+              <a:rPr lang="en-US" sz="4900" b="1" dirty="0" smtClean="0">
                 <a:solidFill>
                   <a:schemeClr val="tx1"/>
                 </a:solidFill>
               </a:rPr>
-              <a:t>Key </a:t>
-            </a:r>
-            <a:r>
-              <a:rPr lang="en-US" sz="4900" b="1" dirty="0" smtClean="0">
-                <a:solidFill>
-                  <a:schemeClr val="tx1"/>
-                </a:solidFill>
-              </a:rPr>
-              <a:t>Findings</a:t>
+              <a:t>Statistical Analysis</a:t>
             </a:r>
             <a:endParaRPr lang="en-US" sz="4900" b="1" dirty="0">
               <a:solidFill>
@@ -11497,10 +13101,10 @@
       </p:sp>
       <p:sp>
         <p:nvSpPr>
-          <p:cNvPr id="8" name="Title 1">
+          <p:cNvPr id="7" name="Title 1">
             <a:extLst>
               <a:ext uri="{FF2B5EF4-FFF2-40B4-BE49-F238E27FC236}">
-                <a16:creationId xmlns:a16="http://schemas.microsoft.com/office/drawing/2014/main" xmlns="" id="{AAB0CBC3-D15A-994D-9504-599724A96D06}"/>
+                <a16:creationId xmlns="" xmlns:a16="http://schemas.microsoft.com/office/drawing/2014/main" id="{5D5169D6-0A70-5F4C-80B4-BE6DCD491A4B}"/>
               </a:ext>
             </a:extLst>
           </p:cNvPr>
@@ -11511,216 +13115,15 @@
         </p:nvSpPr>
         <p:spPr>
           <a:xfrm>
-            <a:off x="191114" y="1428103"/>
-            <a:ext cx="4461922" cy="985208"/>
+            <a:off x="221152" y="743791"/>
+            <a:ext cx="11737705" cy="671513"/>
           </a:xfrm>
           <a:prstGeom prst="rect">
             <a:avLst/>
           </a:prstGeom>
-        </p:spPr>
-        <p:txBody>
-          <a:bodyPr vert="horz" lIns="91440" tIns="45720" rIns="91440" bIns="45720" rtlCol="0" anchor="t">
-            <a:noAutofit/>
-            <a:scene3d>
-              <a:camera prst="orthographicFront"/>
-              <a:lightRig rig="threePt" dir="t"/>
-            </a:scene3d>
-            <a:sp3d extrusionH="57150">
-              <a:bevelT w="82550" h="38100" prst="coolSlant"/>
-              <a:bevelB w="82550" h="38100" prst="coolSlant"/>
-            </a:sp3d>
-          </a:bodyPr>
-          <a:lstStyle>
-            <a:lvl1pPr algn="l" defTabSz="457200" rtl="0" eaLnBrk="1" latinLnBrk="0" hangingPunct="1">
-              <a:spcBef>
-                <a:spcPct val="0"/>
-              </a:spcBef>
-              <a:buNone/>
-              <a:defRPr sz="3600" kern="1200">
-                <a:solidFill>
-                  <a:schemeClr val="accent1"/>
-                </a:solidFill>
-                <a:latin typeface="+mj-lt"/>
-                <a:ea typeface="+mj-ea"/>
-                <a:cs typeface="+mj-cs"/>
-              </a:defRPr>
-            </a:lvl1pPr>
-            <a:lvl2pPr eaLnBrk="1" hangingPunct="1">
-              <a:defRPr>
-                <a:solidFill>
-                  <a:schemeClr val="tx2"/>
-                </a:solidFill>
-              </a:defRPr>
-            </a:lvl2pPr>
-            <a:lvl3pPr eaLnBrk="1" hangingPunct="1">
-              <a:defRPr>
-                <a:solidFill>
-                  <a:schemeClr val="tx2"/>
-                </a:solidFill>
-              </a:defRPr>
-            </a:lvl3pPr>
-            <a:lvl4pPr eaLnBrk="1" hangingPunct="1">
-              <a:defRPr>
-                <a:solidFill>
-                  <a:schemeClr val="tx2"/>
-                </a:solidFill>
-              </a:defRPr>
-            </a:lvl4pPr>
-            <a:lvl5pPr eaLnBrk="1" hangingPunct="1">
-              <a:defRPr>
-                <a:solidFill>
-                  <a:schemeClr val="tx2"/>
-                </a:solidFill>
-              </a:defRPr>
-            </a:lvl5pPr>
-            <a:lvl6pPr eaLnBrk="1" hangingPunct="1">
-              <a:defRPr>
-                <a:solidFill>
-                  <a:schemeClr val="tx2"/>
-                </a:solidFill>
-              </a:defRPr>
-            </a:lvl6pPr>
-            <a:lvl7pPr eaLnBrk="1" hangingPunct="1">
-              <a:defRPr>
-                <a:solidFill>
-                  <a:schemeClr val="tx2"/>
-                </a:solidFill>
-              </a:defRPr>
-            </a:lvl7pPr>
-            <a:lvl8pPr eaLnBrk="1" hangingPunct="1">
-              <a:defRPr>
-                <a:solidFill>
-                  <a:schemeClr val="tx2"/>
-                </a:solidFill>
-              </a:defRPr>
-            </a:lvl8pPr>
-            <a:lvl9pPr eaLnBrk="1" hangingPunct="1">
-              <a:defRPr>
-                <a:solidFill>
-                  <a:schemeClr val="tx2"/>
-                </a:solidFill>
-              </a:defRPr>
-            </a:lvl9pPr>
-          </a:lstStyle>
-          <a:p>
-            <a:pPr algn="ctr"/>
-            <a:r>
-              <a:rPr lang="en-US" sz="2800" b="1" dirty="0" smtClean="0">
-                <a:solidFill>
-                  <a:schemeClr val="tx1"/>
-                </a:solidFill>
-                <a:effectLst>
-                  <a:glow rad="317500">
-                    <a:schemeClr val="accent1">
-                      <a:alpha val="21000"/>
-                    </a:schemeClr>
-                  </a:glow>
-                  <a:outerShdw blurRad="50800" dist="50800" dir="5400000" algn="ctr" rotWithShape="0">
-                    <a:srgbClr val="000000"/>
-                  </a:outerShdw>
-                </a:effectLst>
-                <a:latin typeface="+mn-lt"/>
-              </a:rPr>
-              <a:t>The UNSEEN </a:t>
-            </a:r>
-            <a:r>
-              <a:rPr lang="en-US" sz="2800" b="1" dirty="0">
-                <a:solidFill>
-                  <a:schemeClr val="tx1"/>
-                </a:solidFill>
-                <a:effectLst>
-                  <a:glow rad="317500">
-                    <a:schemeClr val="accent1">
-                      <a:alpha val="21000"/>
-                    </a:schemeClr>
-                  </a:glow>
-                  <a:outerShdw blurRad="50800" dist="50800" dir="5400000" algn="ctr" rotWithShape="0">
-                    <a:srgbClr val="000000"/>
-                  </a:outerShdw>
-                </a:effectLst>
-                <a:latin typeface="+mn-lt"/>
-              </a:rPr>
-              <a:t>MAP of </a:t>
-            </a:r>
-            <a:endParaRPr lang="en-US" sz="2800" b="1" dirty="0" smtClean="0">
-              <a:solidFill>
-                <a:schemeClr val="tx1"/>
-              </a:solidFill>
-              <a:effectLst>
-                <a:glow rad="317500">
-                  <a:schemeClr val="accent1">
-                    <a:alpha val="21000"/>
-                  </a:schemeClr>
-                </a:glow>
-                <a:outerShdw blurRad="50800" dist="50800" dir="5400000" algn="ctr" rotWithShape="0">
-                  <a:srgbClr val="000000"/>
-                </a:outerShdw>
-              </a:effectLst>
-              <a:latin typeface="+mn-lt"/>
-            </a:endParaRPr>
-          </a:p>
-          <a:p>
-            <a:pPr algn="ctr"/>
-            <a:r>
-              <a:rPr lang="en-US" sz="2800" b="1" dirty="0" smtClean="0">
-                <a:solidFill>
-                  <a:schemeClr val="tx1"/>
-                </a:solidFill>
-                <a:effectLst>
-                  <a:glow rad="317500">
-                    <a:schemeClr val="accent1">
-                      <a:alpha val="21000"/>
-                    </a:schemeClr>
-                  </a:glow>
-                  <a:outerShdw blurRad="50800" dist="50800" dir="5400000" algn="ctr" rotWithShape="0">
-                    <a:srgbClr val="000000"/>
-                  </a:outerShdw>
-                </a:effectLst>
-                <a:latin typeface="+mn-lt"/>
-              </a:rPr>
-              <a:t>New York City</a:t>
-            </a:r>
-            <a:endParaRPr lang="en-US" sz="2600" dirty="0">
-              <a:solidFill>
-                <a:schemeClr val="tx1"/>
-              </a:solidFill>
-              <a:effectLst>
-                <a:glow rad="317500">
-                  <a:schemeClr val="accent1">
-                    <a:alpha val="21000"/>
-                  </a:schemeClr>
-                </a:glow>
-                <a:outerShdw blurRad="50800" dist="50800" dir="5400000" algn="ctr" rotWithShape="0">
-                  <a:srgbClr val="000000"/>
-                </a:outerShdw>
-              </a:effectLst>
-              <a:latin typeface="+mn-lt"/>
-            </a:endParaRPr>
-          </a:p>
-        </p:txBody>
-      </p:sp>
-      <p:sp>
-        <p:nvSpPr>
-          <p:cNvPr id="9" name="Title 1">
-            <a:extLst>
-              <a:ext uri="{FF2B5EF4-FFF2-40B4-BE49-F238E27FC236}">
-                <a16:creationId xmlns:a16="http://schemas.microsoft.com/office/drawing/2014/main" xmlns="" id="{AAB0CBC3-D15A-994D-9504-599724A96D06}"/>
-              </a:ext>
-            </a:extLst>
-          </p:cNvPr>
-          <p:cNvSpPr txBox="1">
-            <a:spLocks/>
-          </p:cNvSpPr>
-          <p:nvPr/>
-        </p:nvSpPr>
-        <p:spPr>
-          <a:xfrm>
-            <a:off x="0" y="2809921"/>
-            <a:ext cx="5489348" cy="719960"/>
-          </a:xfrm>
-          <a:prstGeom prst="rect">
-            <a:avLst/>
-          </a:prstGeom>
+          <a:solidFill>
+            <a:schemeClr val="bg1"/>
+          </a:solidFill>
         </p:spPr>
         <p:txBody>
           <a:bodyPr vert="horz" lIns="91440" tIns="45720" rIns="91440" bIns="45720" rtlCol="0" anchor="t">
@@ -11800,126 +13203,271 @@
           </a:lstStyle>
           <a:p>
             <a:r>
-              <a:rPr lang="en-US" sz="2200" b="1" dirty="0" smtClean="0">
+              <a:rPr lang="en-US" sz="2100" b="1" dirty="0" smtClean="0">
                 <a:solidFill>
                   <a:schemeClr val="tx1"/>
                 </a:solidFill>
-                <a:latin typeface="+mn-lt"/>
               </a:rPr>
-              <a:t>Red NTAs: </a:t>
-            </a:r>
-            <a:r>
-              <a:rPr lang="en-US" sz="2200" dirty="0" smtClean="0">
-                <a:solidFill>
-                  <a:schemeClr val="tx1"/>
-                </a:solidFill>
-                <a:latin typeface="+mn-lt"/>
-              </a:rPr>
-              <a:t>log of # of pick ups </a:t>
-            </a:r>
-            <a:r>
-              <a:rPr lang="en-US" sz="2200" b="1" dirty="0" smtClean="0">
-                <a:solidFill>
-                  <a:schemeClr val="tx1"/>
-                </a:solidFill>
-                <a:latin typeface="+mn-lt"/>
-              </a:rPr>
-              <a:t>&gt;</a:t>
-            </a:r>
-            <a:r>
-              <a:rPr lang="en-US" sz="2200" dirty="0" smtClean="0">
-                <a:solidFill>
-                  <a:schemeClr val="tx1"/>
-                </a:solidFill>
-                <a:latin typeface="+mn-lt"/>
-              </a:rPr>
-              <a:t> thresh.</a:t>
-            </a:r>
-          </a:p>
-          <a:p>
-            <a:r>
-              <a:rPr lang="en-US" sz="2200" b="1" dirty="0" smtClean="0">
-                <a:solidFill>
-                  <a:schemeClr val="tx1"/>
-                </a:solidFill>
-                <a:latin typeface="+mn-lt"/>
-              </a:rPr>
-              <a:t>Yellow NTAs: </a:t>
-            </a:r>
-            <a:r>
-              <a:rPr lang="en-US" sz="2200" dirty="0" smtClean="0">
-                <a:solidFill>
-                  <a:schemeClr val="tx1"/>
-                </a:solidFill>
-              </a:rPr>
-              <a:t>log </a:t>
-            </a:r>
-            <a:r>
-              <a:rPr lang="en-US" sz="2200" dirty="0">
-                <a:solidFill>
-                  <a:schemeClr val="tx1"/>
-                </a:solidFill>
-              </a:rPr>
-              <a:t>of # </a:t>
-            </a:r>
-            <a:r>
-              <a:rPr lang="en-US" sz="2200" dirty="0" smtClean="0">
-                <a:solidFill>
-                  <a:schemeClr val="tx1"/>
-                </a:solidFill>
-              </a:rPr>
-              <a:t>pick </a:t>
-            </a:r>
-            <a:r>
-              <a:rPr lang="en-US" sz="2200" dirty="0">
-                <a:solidFill>
-                  <a:schemeClr val="tx1"/>
-                </a:solidFill>
-              </a:rPr>
-              <a:t>ups </a:t>
-            </a:r>
-            <a:r>
-              <a:rPr lang="en-US" sz="2200" b="1" dirty="0" smtClean="0">
-                <a:solidFill>
-                  <a:schemeClr val="tx1"/>
-                </a:solidFill>
-              </a:rPr>
-              <a:t>&lt;</a:t>
-            </a:r>
-            <a:r>
-              <a:rPr lang="en-US" sz="2200" dirty="0" smtClean="0">
-                <a:solidFill>
-                  <a:schemeClr val="tx1"/>
-                </a:solidFill>
-              </a:rPr>
-              <a:t> </a:t>
-            </a:r>
-            <a:r>
-              <a:rPr lang="en-US" sz="2200" dirty="0">
-                <a:solidFill>
-                  <a:schemeClr val="tx1"/>
-                </a:solidFill>
-              </a:rPr>
-              <a:t>thresh.</a:t>
-            </a:r>
-            <a:endParaRPr lang="en-US" sz="2200" dirty="0">
+              <a:t>Hypothesis testing</a:t>
+            </a:r>
+            <a:endParaRPr lang="en-US" sz="2100" b="1" dirty="0">
               <a:solidFill>
                 <a:schemeClr val="tx1"/>
               </a:solidFill>
-              <a:latin typeface="+mn-lt"/>
             </a:endParaRPr>
+          </a:p>
+        </p:txBody>
+      </p:sp>
+      <p:sp>
+        <p:nvSpPr>
+          <p:cNvPr id="2" name="Rectangle 1"/>
+          <p:cNvSpPr/>
+          <p:nvPr/>
+        </p:nvSpPr>
+        <p:spPr>
+          <a:xfrm>
+            <a:off x="471489" y="1267817"/>
+            <a:ext cx="11487368" cy="1708160"/>
+          </a:xfrm>
+          <a:prstGeom prst="rect">
+            <a:avLst/>
+          </a:prstGeom>
+        </p:spPr>
+        <p:txBody>
+          <a:bodyPr wrap="square">
+            <a:spAutoFit/>
+          </a:bodyPr>
+          <a:lstStyle/>
+          <a:p>
+            <a:pPr>
+              <a:buFont typeface="Arial" charset="0"/>
+              <a:buChar char="•"/>
+            </a:pPr>
+            <a:r>
+              <a:rPr lang="en-US" sz="2100" b="1" dirty="0"/>
+              <a:t>H1: </a:t>
+            </a:r>
+            <a:r>
+              <a:rPr lang="en-US" sz="2100" dirty="0"/>
+              <a:t>Due to </a:t>
+            </a:r>
+            <a:r>
+              <a:rPr lang="en-US" sz="2100" dirty="0" smtClean="0"/>
+              <a:t>UBER, the </a:t>
+            </a:r>
+            <a:r>
+              <a:rPr lang="en-US" sz="2100" dirty="0"/>
+              <a:t>travel distances of yellow cabs trips increased. </a:t>
+            </a:r>
+          </a:p>
+          <a:p>
+            <a:pPr>
+              <a:buFont typeface="Arial" charset="0"/>
+              <a:buChar char="•"/>
+            </a:pPr>
+            <a:r>
+              <a:rPr lang="en-US" sz="2100" b="1" dirty="0"/>
+              <a:t>H2: </a:t>
+            </a:r>
+            <a:r>
+              <a:rPr lang="en-US" sz="2100" dirty="0"/>
+              <a:t>Due to </a:t>
+            </a:r>
+            <a:r>
+              <a:rPr lang="en-US" sz="2100" dirty="0" smtClean="0"/>
+              <a:t>UBER, the </a:t>
+            </a:r>
+            <a:r>
+              <a:rPr lang="en-US" sz="2100" dirty="0"/>
+              <a:t>number of trips of yellow cabs was reduced. </a:t>
+            </a:r>
+          </a:p>
+          <a:p>
+            <a:pPr>
+              <a:buFont typeface="Arial" charset="0"/>
+              <a:buChar char="•"/>
+            </a:pPr>
+            <a:r>
+              <a:rPr lang="en-US" sz="2100" b="1" dirty="0"/>
+              <a:t>H3: </a:t>
+            </a:r>
+            <a:r>
+              <a:rPr lang="en-US" sz="2100" dirty="0"/>
+              <a:t>The areas of the city where there is </a:t>
+            </a:r>
+            <a:r>
+              <a:rPr lang="en-US" sz="2100" dirty="0" smtClean="0"/>
+              <a:t>no public transportation coverage, especially for hire transportation, </a:t>
+            </a:r>
+            <a:r>
+              <a:rPr lang="en-US" sz="2100" dirty="0"/>
+              <a:t>correspond to areas with low income </a:t>
+            </a:r>
+            <a:r>
+              <a:rPr lang="en-US" sz="2100" dirty="0" smtClean="0"/>
+              <a:t>families (where ). </a:t>
+            </a:r>
+            <a:endParaRPr lang="en-US" sz="2100" dirty="0"/>
+          </a:p>
+          <a:p>
+            <a:pPr>
+              <a:buFont typeface="Arial" charset="0"/>
+              <a:buChar char="•"/>
+            </a:pPr>
+            <a:r>
+              <a:rPr lang="en-US" sz="2100" b="1" dirty="0"/>
+              <a:t>H4: </a:t>
+            </a:r>
+            <a:r>
+              <a:rPr lang="en-US" sz="2100" dirty="0"/>
+              <a:t>Due to UBER incursion in the city, the price of yellow cabs trips have decreased. </a:t>
+            </a:r>
+            <a:endParaRPr lang="en-US" sz="2100" dirty="0">
+              <a:effectLst/>
+            </a:endParaRPr>
+          </a:p>
+        </p:txBody>
+      </p:sp>
+      <p:sp>
+        <p:nvSpPr>
+          <p:cNvPr id="4" name="Rectangle 3"/>
+          <p:cNvSpPr/>
+          <p:nvPr/>
+        </p:nvSpPr>
+        <p:spPr>
+          <a:xfrm>
+            <a:off x="342901" y="3179829"/>
+            <a:ext cx="11849099" cy="2354491"/>
+          </a:xfrm>
+          <a:prstGeom prst="rect">
+            <a:avLst/>
+          </a:prstGeom>
+        </p:spPr>
+        <p:txBody>
+          <a:bodyPr wrap="square">
+            <a:spAutoFit/>
+          </a:bodyPr>
+          <a:lstStyle/>
+          <a:p>
+            <a:r>
+              <a:rPr lang="en-US" sz="2100" b="1" dirty="0" smtClean="0"/>
+              <a:t>From EDA: </a:t>
+            </a:r>
+          </a:p>
+          <a:p>
+            <a:r>
+              <a:rPr lang="en-US" sz="2100" dirty="0"/>
+              <a:t>	</a:t>
+            </a:r>
+            <a:r>
+              <a:rPr lang="en-US" sz="2100" dirty="0" smtClean="0"/>
+              <a:t>- H2 </a:t>
+            </a:r>
+            <a:r>
+              <a:rPr lang="en-US" sz="2100" dirty="0" smtClean="0">
+                <a:sym typeface="Wingdings"/>
+              </a:rPr>
+              <a:t></a:t>
+            </a:r>
+            <a:r>
+              <a:rPr lang="en-US" sz="2100" dirty="0">
+                <a:sym typeface="Wingdings"/>
+              </a:rPr>
+              <a:t> </a:t>
+            </a:r>
+            <a:r>
+              <a:rPr lang="en-US" sz="2100" b="1" dirty="0" smtClean="0"/>
+              <a:t>confirmed</a:t>
+            </a:r>
+          </a:p>
+          <a:p>
+            <a:r>
+              <a:rPr lang="en-US" sz="2100" dirty="0"/>
+              <a:t>	</a:t>
+            </a:r>
+            <a:r>
+              <a:rPr lang="en-US" sz="2100" dirty="0" smtClean="0"/>
+              <a:t>- H4 </a:t>
+            </a:r>
+            <a:r>
+              <a:rPr lang="en-US" sz="2100" dirty="0" smtClean="0">
+                <a:sym typeface="Wingdings"/>
+              </a:rPr>
+              <a:t> </a:t>
+            </a:r>
+            <a:r>
+              <a:rPr lang="en-US" sz="2100" b="1" dirty="0" smtClean="0"/>
+              <a:t>rejected</a:t>
+            </a:r>
+            <a:r>
+              <a:rPr lang="en-US" sz="2100" dirty="0" smtClean="0"/>
+              <a:t> </a:t>
+            </a:r>
+          </a:p>
+          <a:p>
+            <a:endParaRPr lang="en-US" sz="2100" dirty="0"/>
+          </a:p>
+          <a:p>
+            <a:r>
+              <a:rPr lang="en-US" sz="2100" b="1" dirty="0" smtClean="0"/>
+              <a:t>From </a:t>
+            </a:r>
+            <a:r>
+              <a:rPr lang="en-US" sz="2100" b="1" dirty="0" err="1" smtClean="0"/>
+              <a:t>ttest</a:t>
+            </a:r>
+            <a:r>
+              <a:rPr lang="en-US" sz="2100" b="1" dirty="0" smtClean="0"/>
+              <a:t>:</a:t>
+            </a:r>
+          </a:p>
+          <a:p>
+            <a:r>
+              <a:rPr lang="en-US" sz="2100" dirty="0" smtClean="0"/>
+              <a:t>	- H1 </a:t>
+            </a:r>
+            <a:r>
+              <a:rPr lang="en-US" sz="2100" dirty="0">
+                <a:sym typeface="Wingdings"/>
+              </a:rPr>
+              <a:t> </a:t>
+            </a:r>
+            <a:r>
+              <a:rPr lang="en-US" sz="2100" dirty="0" smtClean="0"/>
+              <a:t>Null </a:t>
+            </a:r>
+            <a:r>
+              <a:rPr lang="en-US" sz="2100" dirty="0"/>
+              <a:t>hypothesis </a:t>
+            </a:r>
+            <a:r>
+              <a:rPr lang="en-US" sz="2100" dirty="0" smtClean="0"/>
+              <a:t>(no change </a:t>
+            </a:r>
+            <a:r>
+              <a:rPr lang="en-US" sz="2100" dirty="0"/>
+              <a:t>in the mean distance </a:t>
+            </a:r>
+            <a:r>
+              <a:rPr lang="en-US" sz="2100" dirty="0" smtClean="0"/>
+              <a:t>of Yellow cabs in 2014 and 2015) </a:t>
+            </a:r>
+            <a:r>
+              <a:rPr lang="en-US" sz="2100" b="1" dirty="0" smtClean="0"/>
+              <a:t>rejected</a:t>
+            </a:r>
           </a:p>
         </p:txBody>
       </p:sp>
       <p:pic>
         <p:nvPicPr>
-          <p:cNvPr id="11" name="Picture 10"/>
+          <p:cNvPr id="8" name="Picture 7"/>
           <p:cNvPicPr>
             <a:picLocks noChangeAspect="1"/>
           </p:cNvPicPr>
           <p:nvPr/>
         </p:nvPicPr>
-        <p:blipFill>
+        <p:blipFill rotWithShape="1">
           <a:blip r:embed="rId2">
             <a:extLst>
               <a:ext uri="{28A0092B-C50C-407E-A947-70E740481C1C}">
@@ -11927,102 +13475,23 @@
               </a:ext>
             </a:extLst>
           </a:blip>
-          <a:stretch>
-            <a:fillRect/>
-          </a:stretch>
+          <a:srcRect b="8142"/>
+          <a:stretch/>
         </p:blipFill>
         <p:spPr>
           <a:xfrm>
-            <a:off x="5381605" y="183630"/>
-            <a:ext cx="6698474" cy="6436695"/>
+            <a:off x="3103419" y="5273354"/>
+            <a:ext cx="5312139" cy="1265326"/>
           </a:xfrm>
           <a:prstGeom prst="rect">
             <a:avLst/>
           </a:prstGeom>
-          <a:effectLst>
-            <a:outerShdw blurRad="50800" dist="50800" dir="5400000" algn="ctr" rotWithShape="0">
-              <a:srgbClr val="000000">
-                <a:alpha val="71000"/>
-              </a:srgbClr>
-            </a:outerShdw>
-          </a:effectLst>
-          <a:scene3d>
-            <a:camera prst="orthographicFront"/>
-            <a:lightRig rig="threePt" dir="t"/>
-          </a:scene3d>
-          <a:sp3d>
-            <a:bevelT w="165100" prst="coolSlant"/>
-            <a:bevelB w="165100" prst="coolSlant"/>
-          </a:sp3d>
         </p:spPr>
       </p:pic>
-      <p:sp>
-        <p:nvSpPr>
-          <p:cNvPr id="5" name="Rectangle 4"/>
-          <p:cNvSpPr/>
-          <p:nvPr/>
-        </p:nvSpPr>
-        <p:spPr>
-          <a:xfrm>
-            <a:off x="0" y="3926491"/>
-            <a:ext cx="5298234" cy="2031325"/>
-          </a:xfrm>
-          <a:prstGeom prst="rect">
-            <a:avLst/>
-          </a:prstGeom>
-          <a:solidFill>
-            <a:schemeClr val="bg1"/>
-          </a:solidFill>
-        </p:spPr>
-        <p:txBody>
-          <a:bodyPr wrap="square">
-            <a:spAutoFit/>
-          </a:bodyPr>
-          <a:lstStyle/>
-          <a:p>
-            <a:pPr algn="just"/>
-            <a:r>
-              <a:rPr lang="en-US" sz="2300" b="1" dirty="0" smtClean="0"/>
-              <a:t>    The Map reveals:</a:t>
-            </a:r>
-          </a:p>
-          <a:p>
-            <a:pPr algn="just"/>
-            <a:endParaRPr lang="en-US" sz="2300" dirty="0"/>
-          </a:p>
-          <a:p>
-            <a:pPr marL="342900" indent="-342900" algn="just">
-              <a:buFont typeface="Arial" charset="0"/>
-              <a:buChar char="•"/>
-            </a:pPr>
-            <a:r>
-              <a:rPr lang="en-US" sz="2000" dirty="0" smtClean="0"/>
-              <a:t>Possible </a:t>
-            </a:r>
-            <a:r>
-              <a:rPr lang="en-US" sz="2000" dirty="0"/>
-              <a:t>areas unattended by different transportation means (yellow areas). </a:t>
-            </a:r>
-          </a:p>
-          <a:p>
-            <a:pPr marL="342900" indent="-342900" algn="just">
-              <a:buFont typeface="Arial" charset="0"/>
-              <a:buChar char="•"/>
-            </a:pPr>
-            <a:r>
-              <a:rPr lang="en-US" sz="2000" dirty="0"/>
-              <a:t>An idea of people’s mobility choices, depending on where they live. </a:t>
-            </a:r>
-            <a:endParaRPr lang="en-US" sz="2000" dirty="0">
-              <a:effectLst/>
-            </a:endParaRPr>
-          </a:p>
-        </p:txBody>
-      </p:sp>
     </p:spTree>
     <p:extLst>
       <p:ext uri="{BB962C8B-B14F-4D97-AF65-F5344CB8AC3E}">
-        <p14:creationId xmlns:p14="http://schemas.microsoft.com/office/powerpoint/2010/main" val="1743060850"/>
+        <p14:creationId xmlns:p14="http://schemas.microsoft.com/office/powerpoint/2010/main" val="879796445"/>
       </p:ext>
     </p:extLst>
   </p:cSld>

</xml_diff>